<commit_message>
minor changes to prelim processing and instrumentation presentation
</commit_message>
<xml_diff>
--- a/Planning/Instrumentation.pptx
+++ b/Planning/Instrumentation.pptx
@@ -7,8 +7,9 @@
   <p:sldIdLst>
     <p:sldId id="256" r:id="rId2"/>
     <p:sldId id="257" r:id="rId3"/>
-    <p:sldId id="258" r:id="rId4"/>
-    <p:sldId id="259" r:id="rId5"/>
+    <p:sldId id="260" r:id="rId4"/>
+    <p:sldId id="258" r:id="rId5"/>
+    <p:sldId id="259" r:id="rId6"/>
   </p:sldIdLst>
   <p:sldSz cx="9144000" cy="6858000" type="screen4x3"/>
   <p:notesSz cx="6858000" cy="9144000"/>
@@ -291,7 +292,7 @@
           <a:p>
             <a:fld id="{529DB64B-6E35-4203-B64C-6EB56B5A725F}" type="datetimeFigureOut">
               <a:rPr lang="en-US" smtClean="0"/>
-              <a:t>7/15/2016</a:t>
+              <a:t>7/18/2016</a:t>
             </a:fld>
             <a:endParaRPr lang="en-US"/>
           </a:p>
@@ -461,7 +462,7 @@
           <a:p>
             <a:fld id="{529DB64B-6E35-4203-B64C-6EB56B5A725F}" type="datetimeFigureOut">
               <a:rPr lang="en-US" smtClean="0"/>
-              <a:t>7/15/2016</a:t>
+              <a:t>7/18/2016</a:t>
             </a:fld>
             <a:endParaRPr lang="en-US"/>
           </a:p>
@@ -641,7 +642,7 @@
           <a:p>
             <a:fld id="{529DB64B-6E35-4203-B64C-6EB56B5A725F}" type="datetimeFigureOut">
               <a:rPr lang="en-US" smtClean="0"/>
-              <a:t>7/15/2016</a:t>
+              <a:t>7/18/2016</a:t>
             </a:fld>
             <a:endParaRPr lang="en-US"/>
           </a:p>
@@ -811,7 +812,7 @@
           <a:p>
             <a:fld id="{529DB64B-6E35-4203-B64C-6EB56B5A725F}" type="datetimeFigureOut">
               <a:rPr lang="en-US" smtClean="0"/>
-              <a:t>7/15/2016</a:t>
+              <a:t>7/18/2016</a:t>
             </a:fld>
             <a:endParaRPr lang="en-US"/>
           </a:p>
@@ -1057,7 +1058,7 @@
           <a:p>
             <a:fld id="{529DB64B-6E35-4203-B64C-6EB56B5A725F}" type="datetimeFigureOut">
               <a:rPr lang="en-US" smtClean="0"/>
-              <a:t>7/15/2016</a:t>
+              <a:t>7/18/2016</a:t>
             </a:fld>
             <a:endParaRPr lang="en-US"/>
           </a:p>
@@ -1345,7 +1346,7 @@
           <a:p>
             <a:fld id="{529DB64B-6E35-4203-B64C-6EB56B5A725F}" type="datetimeFigureOut">
               <a:rPr lang="en-US" smtClean="0"/>
-              <a:t>7/15/2016</a:t>
+              <a:t>7/18/2016</a:t>
             </a:fld>
             <a:endParaRPr lang="en-US"/>
           </a:p>
@@ -1767,7 +1768,7 @@
           <a:p>
             <a:fld id="{529DB64B-6E35-4203-B64C-6EB56B5A725F}" type="datetimeFigureOut">
               <a:rPr lang="en-US" smtClean="0"/>
-              <a:t>7/15/2016</a:t>
+              <a:t>7/18/2016</a:t>
             </a:fld>
             <a:endParaRPr lang="en-US"/>
           </a:p>
@@ -1885,7 +1886,7 @@
           <a:p>
             <a:fld id="{529DB64B-6E35-4203-B64C-6EB56B5A725F}" type="datetimeFigureOut">
               <a:rPr lang="en-US" smtClean="0"/>
-              <a:t>7/15/2016</a:t>
+              <a:t>7/18/2016</a:t>
             </a:fld>
             <a:endParaRPr lang="en-US"/>
           </a:p>
@@ -1980,7 +1981,7 @@
           <a:p>
             <a:fld id="{529DB64B-6E35-4203-B64C-6EB56B5A725F}" type="datetimeFigureOut">
               <a:rPr lang="en-US" smtClean="0"/>
-              <a:t>7/15/2016</a:t>
+              <a:t>7/18/2016</a:t>
             </a:fld>
             <a:endParaRPr lang="en-US"/>
           </a:p>
@@ -2257,7 +2258,7 @@
           <a:p>
             <a:fld id="{529DB64B-6E35-4203-B64C-6EB56B5A725F}" type="datetimeFigureOut">
               <a:rPr lang="en-US" smtClean="0"/>
-              <a:t>7/15/2016</a:t>
+              <a:t>7/18/2016</a:t>
             </a:fld>
             <a:endParaRPr lang="en-US"/>
           </a:p>
@@ -2510,7 +2511,7 @@
           <a:p>
             <a:fld id="{529DB64B-6E35-4203-B64C-6EB56B5A725F}" type="datetimeFigureOut">
               <a:rPr lang="en-US" smtClean="0"/>
-              <a:t>7/15/2016</a:t>
+              <a:t>7/18/2016</a:t>
             </a:fld>
             <a:endParaRPr lang="en-US"/>
           </a:p>
@@ -2723,7 +2724,7 @@
           <a:p>
             <a:fld id="{529DB64B-6E35-4203-B64C-6EB56B5A725F}" type="datetimeFigureOut">
               <a:rPr lang="en-US" smtClean="0"/>
-              <a:t>7/15/2016</a:t>
+              <a:t>7/18/2016</a:t>
             </a:fld>
             <a:endParaRPr lang="en-US"/>
           </a:p>
@@ -5775,6 +5776,406 @@
           <a:chExt cx="0" cy="0"/>
         </a:xfrm>
       </p:grpSpPr>
+      <p:graphicFrame>
+        <p:nvGraphicFramePr>
+          <p:cNvPr id="2" name="Table 1"/>
+          <p:cNvGraphicFramePr>
+            <a:graphicFrameLocks noGrp="1"/>
+          </p:cNvGraphicFramePr>
+          <p:nvPr>
+            <p:extLst>
+              <p:ext uri="{D42A27DB-BD31-4B8C-83A1-F6EECF244321}">
+                <p14:modId xmlns:p14="http://schemas.microsoft.com/office/powerpoint/2010/main" val="1656149894"/>
+              </p:ext>
+            </p:extLst>
+          </p:nvPr>
+        </p:nvGraphicFramePr>
+        <p:xfrm>
+          <a:off x="304800" y="228600"/>
+          <a:ext cx="4117785" cy="1854200"/>
+        </p:xfrm>
+        <a:graphic>
+          <a:graphicData uri="http://schemas.openxmlformats.org/drawingml/2006/table">
+            <a:tbl>
+              <a:tblPr firstRow="1" bandRow="1">
+                <a:tableStyleId>{5C22544A-7EE6-4342-B048-85BDC9FD1C3A}</a:tableStyleId>
+              </a:tblPr>
+              <a:tblGrid>
+                <a:gridCol w="3048000"/>
+                <a:gridCol w="1069785"/>
+              </a:tblGrid>
+              <a:tr h="370840">
+                <a:tc>
+                  <a:txBody>
+                    <a:bodyPr/>
+                    <a:lstStyle/>
+                    <a:p>
+                      <a:r>
+                        <a:rPr lang="en-US" dirty="0" smtClean="0"/>
+                        <a:t>Cable Length</a:t>
+                      </a:r>
+                    </a:p>
+                  </a:txBody>
+                  <a:tcPr/>
+                </a:tc>
+                <a:tc>
+                  <a:txBody>
+                    <a:bodyPr/>
+                    <a:lstStyle/>
+                    <a:p>
+                      <a:r>
+                        <a:rPr lang="en-US" dirty="0" smtClean="0"/>
+                        <a:t>Quantity</a:t>
+                      </a:r>
+                      <a:endParaRPr lang="en-US" dirty="0"/>
+                    </a:p>
+                  </a:txBody>
+                  <a:tcPr/>
+                </a:tc>
+              </a:tr>
+              <a:tr h="370840">
+                <a:tc>
+                  <a:txBody>
+                    <a:bodyPr/>
+                    <a:lstStyle/>
+                    <a:p>
+                      <a:r>
+                        <a:rPr lang="en-US" dirty="0" smtClean="0"/>
+                        <a:t>100’ Extensions</a:t>
+                      </a:r>
+                      <a:endParaRPr lang="en-US" dirty="0"/>
+                    </a:p>
+                  </a:txBody>
+                  <a:tcPr/>
+                </a:tc>
+                <a:tc>
+                  <a:txBody>
+                    <a:bodyPr/>
+                    <a:lstStyle/>
+                    <a:p>
+                      <a:r>
+                        <a:rPr lang="en-US" dirty="0" smtClean="0"/>
+                        <a:t>11</a:t>
+                      </a:r>
+                      <a:endParaRPr lang="en-US" dirty="0"/>
+                    </a:p>
+                  </a:txBody>
+                  <a:tcPr/>
+                </a:tc>
+              </a:tr>
+              <a:tr h="370840">
+                <a:tc>
+                  <a:txBody>
+                    <a:bodyPr/>
+                    <a:lstStyle/>
+                    <a:p>
+                      <a:r>
+                        <a:rPr lang="en-US" dirty="0" smtClean="0"/>
+                        <a:t>100’ PCB</a:t>
+                      </a:r>
+                      <a:r>
+                        <a:rPr lang="en-US" baseline="0" dirty="0" smtClean="0"/>
+                        <a:t> Cables</a:t>
+                      </a:r>
+                      <a:endParaRPr lang="en-US" dirty="0"/>
+                    </a:p>
+                  </a:txBody>
+                  <a:tcPr/>
+                </a:tc>
+                <a:tc>
+                  <a:txBody>
+                    <a:bodyPr/>
+                    <a:lstStyle/>
+                    <a:p>
+                      <a:r>
+                        <a:rPr lang="en-US" dirty="0" smtClean="0"/>
+                        <a:t>32</a:t>
+                      </a:r>
+                      <a:endParaRPr lang="en-US" dirty="0"/>
+                    </a:p>
+                  </a:txBody>
+                  <a:tcPr/>
+                </a:tc>
+              </a:tr>
+              <a:tr h="370840">
+                <a:tc>
+                  <a:txBody>
+                    <a:bodyPr/>
+                    <a:lstStyle/>
+                    <a:p>
+                      <a:r>
+                        <a:rPr lang="en-US" dirty="0" smtClean="0"/>
+                        <a:t>Accelerometers</a:t>
+                      </a:r>
+                      <a:endParaRPr lang="en-US" dirty="0"/>
+                    </a:p>
+                  </a:txBody>
+                  <a:tcPr/>
+                </a:tc>
+                <a:tc>
+                  <a:txBody>
+                    <a:bodyPr/>
+                    <a:lstStyle/>
+                    <a:p>
+                      <a:r>
+                        <a:rPr lang="en-US" dirty="0" smtClean="0"/>
+                        <a:t>32</a:t>
+                      </a:r>
+                      <a:endParaRPr lang="en-US" dirty="0"/>
+                    </a:p>
+                  </a:txBody>
+                  <a:tcPr/>
+                </a:tc>
+              </a:tr>
+              <a:tr h="370840">
+                <a:tc>
+                  <a:txBody>
+                    <a:bodyPr/>
+                    <a:lstStyle/>
+                    <a:p>
+                      <a:r>
+                        <a:rPr lang="en-US" dirty="0" smtClean="0"/>
+                        <a:t>Magnets</a:t>
+                      </a:r>
+                      <a:endParaRPr lang="en-US" dirty="0"/>
+                    </a:p>
+                  </a:txBody>
+                  <a:tcPr/>
+                </a:tc>
+                <a:tc>
+                  <a:txBody>
+                    <a:bodyPr/>
+                    <a:lstStyle/>
+                    <a:p>
+                      <a:r>
+                        <a:rPr lang="en-US" dirty="0" smtClean="0"/>
+                        <a:t>24</a:t>
+                      </a:r>
+                      <a:endParaRPr lang="en-US" dirty="0"/>
+                    </a:p>
+                  </a:txBody>
+                  <a:tcPr/>
+                </a:tc>
+              </a:tr>
+            </a:tbl>
+          </a:graphicData>
+        </a:graphic>
+      </p:graphicFrame>
+      <p:graphicFrame>
+        <p:nvGraphicFramePr>
+          <p:cNvPr id="3" name="Table 2"/>
+          <p:cNvGraphicFramePr>
+            <a:graphicFrameLocks noGrp="1"/>
+          </p:cNvGraphicFramePr>
+          <p:nvPr>
+            <p:extLst>
+              <p:ext uri="{D42A27DB-BD31-4B8C-83A1-F6EECF244321}">
+                <p14:modId xmlns:p14="http://schemas.microsoft.com/office/powerpoint/2010/main" val="2885215602"/>
+              </p:ext>
+            </p:extLst>
+          </p:nvPr>
+        </p:nvGraphicFramePr>
+        <p:xfrm>
+          <a:off x="304800" y="2438400"/>
+          <a:ext cx="4117785" cy="1854200"/>
+        </p:xfrm>
+        <a:graphic>
+          <a:graphicData uri="http://schemas.openxmlformats.org/drawingml/2006/table">
+            <a:tbl>
+              <a:tblPr firstRow="1" bandRow="1">
+                <a:tableStyleId>{5C22544A-7EE6-4342-B048-85BDC9FD1C3A}</a:tableStyleId>
+              </a:tblPr>
+              <a:tblGrid>
+                <a:gridCol w="3048000"/>
+                <a:gridCol w="1069785"/>
+              </a:tblGrid>
+              <a:tr h="370840">
+                <a:tc>
+                  <a:txBody>
+                    <a:bodyPr/>
+                    <a:lstStyle/>
+                    <a:p>
+                      <a:r>
+                        <a:rPr lang="en-US" dirty="0" smtClean="0"/>
+                        <a:t>Item</a:t>
+                      </a:r>
+                      <a:endParaRPr lang="en-US" dirty="0"/>
+                    </a:p>
+                  </a:txBody>
+                  <a:tcPr/>
+                </a:tc>
+                <a:tc>
+                  <a:txBody>
+                    <a:bodyPr/>
+                    <a:lstStyle/>
+                    <a:p>
+                      <a:r>
+                        <a:rPr lang="en-US" dirty="0" smtClean="0"/>
+                        <a:t>Quantity</a:t>
+                      </a:r>
+                      <a:endParaRPr lang="en-US" dirty="0"/>
+                    </a:p>
+                  </a:txBody>
+                  <a:tcPr/>
+                </a:tc>
+              </a:tr>
+              <a:tr h="370840">
+                <a:tc>
+                  <a:txBody>
+                    <a:bodyPr/>
+                    <a:lstStyle/>
+                    <a:p>
+                      <a:r>
+                        <a:rPr lang="en-US" dirty="0" smtClean="0"/>
+                        <a:t>Torch</a:t>
+                      </a:r>
+                      <a:endParaRPr lang="en-US" dirty="0"/>
+                    </a:p>
+                  </a:txBody>
+                  <a:tcPr/>
+                </a:tc>
+                <a:tc>
+                  <a:txBody>
+                    <a:bodyPr/>
+                    <a:lstStyle/>
+                    <a:p>
+                      <a:r>
+                        <a:rPr lang="en-US" dirty="0" smtClean="0"/>
+                        <a:t>2</a:t>
+                      </a:r>
+                      <a:endParaRPr lang="en-US" dirty="0"/>
+                    </a:p>
+                  </a:txBody>
+                  <a:tcPr/>
+                </a:tc>
+              </a:tr>
+              <a:tr h="370840">
+                <a:tc>
+                  <a:txBody>
+                    <a:bodyPr/>
+                    <a:lstStyle/>
+                    <a:p>
+                      <a:r>
+                        <a:rPr lang="en-US" dirty="0" smtClean="0"/>
+                        <a:t>Hot Glue Sticks</a:t>
+                      </a:r>
+                      <a:endParaRPr lang="en-US" dirty="0"/>
+                    </a:p>
+                  </a:txBody>
+                  <a:tcPr/>
+                </a:tc>
+                <a:tc>
+                  <a:txBody>
+                    <a:bodyPr/>
+                    <a:lstStyle/>
+                    <a:p>
+                      <a:r>
+                        <a:rPr lang="en-US" dirty="0" smtClean="0"/>
+                        <a:t>5</a:t>
+                      </a:r>
+                      <a:endParaRPr lang="en-US" dirty="0"/>
+                    </a:p>
+                  </a:txBody>
+                  <a:tcPr/>
+                </a:tc>
+              </a:tr>
+              <a:tr h="370840">
+                <a:tc>
+                  <a:txBody>
+                    <a:bodyPr/>
+                    <a:lstStyle/>
+                    <a:p>
+                      <a:r>
+                        <a:rPr lang="en-US" dirty="0" smtClean="0"/>
+                        <a:t>Strain Relief</a:t>
+                      </a:r>
+                      <a:r>
+                        <a:rPr lang="en-US" baseline="0" dirty="0" smtClean="0"/>
+                        <a:t> Tabs</a:t>
+                      </a:r>
+                    </a:p>
+                  </a:txBody>
+                  <a:tcPr/>
+                </a:tc>
+                <a:tc>
+                  <a:txBody>
+                    <a:bodyPr/>
+                    <a:lstStyle/>
+                    <a:p>
+                      <a:r>
+                        <a:rPr lang="en-US" dirty="0" smtClean="0"/>
+                        <a:t>10</a:t>
+                      </a:r>
+                      <a:endParaRPr lang="en-US" dirty="0"/>
+                    </a:p>
+                  </a:txBody>
+                  <a:tcPr/>
+                </a:tc>
+              </a:tr>
+              <a:tr h="370840">
+                <a:tc>
+                  <a:txBody>
+                    <a:bodyPr/>
+                    <a:lstStyle/>
+                    <a:p>
+                      <a:r>
+                        <a:rPr lang="en-US" dirty="0" smtClean="0"/>
+                        <a:t>Zip Ties</a:t>
+                      </a:r>
+                      <a:endParaRPr lang="en-US" dirty="0"/>
+                    </a:p>
+                  </a:txBody>
+                  <a:tcPr/>
+                </a:tc>
+                <a:tc>
+                  <a:txBody>
+                    <a:bodyPr/>
+                    <a:lstStyle/>
+                    <a:p>
+                      <a:r>
+                        <a:rPr lang="en-US" dirty="0" smtClean="0"/>
+                        <a:t>100</a:t>
+                      </a:r>
+                      <a:endParaRPr lang="en-US" dirty="0"/>
+                    </a:p>
+                  </a:txBody>
+                  <a:tcPr/>
+                </a:tc>
+              </a:tr>
+            </a:tbl>
+          </a:graphicData>
+        </a:graphic>
+      </p:graphicFrame>
+    </p:spTree>
+    <p:extLst>
+      <p:ext uri="{BB962C8B-B14F-4D97-AF65-F5344CB8AC3E}">
+        <p14:creationId xmlns:p14="http://schemas.microsoft.com/office/powerpoint/2010/main" val="2292256899"/>
+      </p:ext>
+    </p:extLst>
+  </p:cSld>
+  <p:clrMapOvr>
+    <a:masterClrMapping/>
+  </p:clrMapOvr>
+</p:sld>
+</file>
+
+<file path=ppt/slides/slide4.xml><?xml version="1.0" encoding="utf-8"?>
+<p:sld xmlns:a="http://schemas.openxmlformats.org/drawingml/2006/main" xmlns:r="http://schemas.openxmlformats.org/officeDocument/2006/relationships" xmlns:p="http://schemas.openxmlformats.org/presentationml/2006/main">
+  <p:cSld>
+    <p:spTree>
+      <p:nvGrpSpPr>
+        <p:cNvPr id="1" name=""/>
+        <p:cNvGrpSpPr/>
+        <p:nvPr/>
+      </p:nvGrpSpPr>
+      <p:grpSpPr>
+        <a:xfrm>
+          <a:off x="0" y="0"/>
+          <a:ext cx="0" cy="0"/>
+          <a:chOff x="0" y="0"/>
+          <a:chExt cx="0" cy="0"/>
+        </a:xfrm>
+      </p:grpSpPr>
       <p:sp>
         <p:nvSpPr>
           <p:cNvPr id="5" name="Rectangle 4"/>
@@ -7172,7 +7573,7 @@
 </p:sld>
 </file>
 
-<file path=ppt/slides/slide4.xml><?xml version="1.0" encoding="utf-8"?>
+<file path=ppt/slides/slide5.xml><?xml version="1.0" encoding="utf-8"?>
 <p:sld xmlns:a="http://schemas.openxmlformats.org/drawingml/2006/main" xmlns:r="http://schemas.openxmlformats.org/officeDocument/2006/relationships" xmlns:p="http://schemas.openxmlformats.org/presentationml/2006/main">
   <p:cSld>
     <p:spTree>

</xml_diff>

<commit_message>
Content from processing of acceleration data
</commit_message>
<xml_diff>
--- a/Planning/Instrumentation.pptx
+++ b/Planning/Instrumentation.pptx
@@ -8,7 +8,9 @@
     <p:sldId id="256" r:id="rId2"/>
     <p:sldId id="261" r:id="rId3"/>
     <p:sldId id="257" r:id="rId4"/>
-    <p:sldId id="260" r:id="rId5"/>
+    <p:sldId id="263" r:id="rId5"/>
+    <p:sldId id="262" r:id="rId6"/>
+    <p:sldId id="260" r:id="rId7"/>
   </p:sldIdLst>
   <p:sldSz cx="9144000" cy="6858000" type="screen4x3"/>
   <p:notesSz cx="6858000" cy="9144000"/>
@@ -291,7 +293,7 @@
           <a:p>
             <a:fld id="{529DB64B-6E35-4203-B64C-6EB56B5A725F}" type="datetimeFigureOut">
               <a:rPr lang="en-US" smtClean="0"/>
-              <a:t>7/21/2016</a:t>
+              <a:t>8/12/2016</a:t>
             </a:fld>
             <a:endParaRPr lang="en-US"/>
           </a:p>
@@ -461,7 +463,7 @@
           <a:p>
             <a:fld id="{529DB64B-6E35-4203-B64C-6EB56B5A725F}" type="datetimeFigureOut">
               <a:rPr lang="en-US" smtClean="0"/>
-              <a:t>7/21/2016</a:t>
+              <a:t>8/12/2016</a:t>
             </a:fld>
             <a:endParaRPr lang="en-US"/>
           </a:p>
@@ -641,7 +643,7 @@
           <a:p>
             <a:fld id="{529DB64B-6E35-4203-B64C-6EB56B5A725F}" type="datetimeFigureOut">
               <a:rPr lang="en-US" smtClean="0"/>
-              <a:t>7/21/2016</a:t>
+              <a:t>8/12/2016</a:t>
             </a:fld>
             <a:endParaRPr lang="en-US"/>
           </a:p>
@@ -811,7 +813,7 @@
           <a:p>
             <a:fld id="{529DB64B-6E35-4203-B64C-6EB56B5A725F}" type="datetimeFigureOut">
               <a:rPr lang="en-US" smtClean="0"/>
-              <a:t>7/21/2016</a:t>
+              <a:t>8/12/2016</a:t>
             </a:fld>
             <a:endParaRPr lang="en-US"/>
           </a:p>
@@ -1057,7 +1059,7 @@
           <a:p>
             <a:fld id="{529DB64B-6E35-4203-B64C-6EB56B5A725F}" type="datetimeFigureOut">
               <a:rPr lang="en-US" smtClean="0"/>
-              <a:t>7/21/2016</a:t>
+              <a:t>8/12/2016</a:t>
             </a:fld>
             <a:endParaRPr lang="en-US"/>
           </a:p>
@@ -1345,7 +1347,7 @@
           <a:p>
             <a:fld id="{529DB64B-6E35-4203-B64C-6EB56B5A725F}" type="datetimeFigureOut">
               <a:rPr lang="en-US" smtClean="0"/>
-              <a:t>7/21/2016</a:t>
+              <a:t>8/12/2016</a:t>
             </a:fld>
             <a:endParaRPr lang="en-US"/>
           </a:p>
@@ -1767,7 +1769,7 @@
           <a:p>
             <a:fld id="{529DB64B-6E35-4203-B64C-6EB56B5A725F}" type="datetimeFigureOut">
               <a:rPr lang="en-US" smtClean="0"/>
-              <a:t>7/21/2016</a:t>
+              <a:t>8/12/2016</a:t>
             </a:fld>
             <a:endParaRPr lang="en-US"/>
           </a:p>
@@ -1885,7 +1887,7 @@
           <a:p>
             <a:fld id="{529DB64B-6E35-4203-B64C-6EB56B5A725F}" type="datetimeFigureOut">
               <a:rPr lang="en-US" smtClean="0"/>
-              <a:t>7/21/2016</a:t>
+              <a:t>8/12/2016</a:t>
             </a:fld>
             <a:endParaRPr lang="en-US"/>
           </a:p>
@@ -1980,7 +1982,7 @@
           <a:p>
             <a:fld id="{529DB64B-6E35-4203-B64C-6EB56B5A725F}" type="datetimeFigureOut">
               <a:rPr lang="en-US" smtClean="0"/>
-              <a:t>7/21/2016</a:t>
+              <a:t>8/12/2016</a:t>
             </a:fld>
             <a:endParaRPr lang="en-US"/>
           </a:p>
@@ -2257,7 +2259,7 @@
           <a:p>
             <a:fld id="{529DB64B-6E35-4203-B64C-6EB56B5A725F}" type="datetimeFigureOut">
               <a:rPr lang="en-US" smtClean="0"/>
-              <a:t>7/21/2016</a:t>
+              <a:t>8/12/2016</a:t>
             </a:fld>
             <a:endParaRPr lang="en-US"/>
           </a:p>
@@ -2510,7 +2512,7 @@
           <a:p>
             <a:fld id="{529DB64B-6E35-4203-B64C-6EB56B5A725F}" type="datetimeFigureOut">
               <a:rPr lang="en-US" smtClean="0"/>
-              <a:t>7/21/2016</a:t>
+              <a:t>8/12/2016</a:t>
             </a:fld>
             <a:endParaRPr lang="en-US"/>
           </a:p>
@@ -2723,7 +2725,7 @@
           <a:p>
             <a:fld id="{529DB64B-6E35-4203-B64C-6EB56B5A725F}" type="datetimeFigureOut">
               <a:rPr lang="en-US" smtClean="0"/>
-              <a:t>7/21/2016</a:t>
+              <a:t>8/12/2016</a:t>
             </a:fld>
             <a:endParaRPr lang="en-US"/>
           </a:p>
@@ -3515,13 +3517,8 @@
           <a:p>
             <a:r>
               <a:rPr lang="en-US" dirty="0" smtClean="0"/>
-              <a:t>32 </a:t>
+              <a:t>32 Accelerometers:</a:t>
             </a:r>
-            <a:r>
-              <a:rPr lang="en-US" dirty="0" smtClean="0"/>
-              <a:t>Accelerometers:</a:t>
-            </a:r>
-            <a:endParaRPr lang="en-US" dirty="0" smtClean="0"/>
           </a:p>
           <a:p>
             <a:pPr marL="285750" indent="-285750">
@@ -3549,11 +3546,7 @@
             </a:r>
             <a:r>
               <a:rPr lang="en-US" dirty="0" smtClean="0"/>
-              <a:t> </a:t>
-            </a:r>
-            <a:r>
-              <a:rPr lang="en-US" dirty="0" smtClean="0"/>
-              <a:t>transversely oriented </a:t>
+              <a:t> transversely oriented </a:t>
             </a:r>
             <a:r>
               <a:rPr lang="en-US" dirty="0" err="1" smtClean="0"/>
@@ -3572,11 +3565,7 @@
             </a:r>
             <a:r>
               <a:rPr lang="en-US" dirty="0" smtClean="0"/>
-              <a:t> </a:t>
-            </a:r>
-            <a:r>
-              <a:rPr lang="en-US" dirty="0" smtClean="0"/>
-              <a:t>longitudinally oriented </a:t>
+              <a:t> longitudinally oriented </a:t>
             </a:r>
             <a:r>
               <a:rPr lang="en-US" dirty="0" err="1" smtClean="0"/>
@@ -3643,11 +3632,7 @@
           <a:p>
             <a:r>
               <a:rPr lang="en-US" b="1" dirty="0" smtClean="0"/>
-              <a:t>Instrumentation </a:t>
-            </a:r>
-            <a:r>
-              <a:rPr lang="en-US" b="1" dirty="0" smtClean="0"/>
-              <a:t>Plan</a:t>
+              <a:t>Instrumentation Plan</a:t>
             </a:r>
             <a:endParaRPr lang="en-US" b="1" dirty="0"/>
           </a:p>
@@ -9218,6 +9203,4778 @@
 </file>
 
 <file path=ppt/slides/slide4.xml><?xml version="1.0" encoding="utf-8"?>
+<p:sld xmlns:a="http://schemas.openxmlformats.org/drawingml/2006/main" xmlns:r="http://schemas.openxmlformats.org/officeDocument/2006/relationships" xmlns:p="http://schemas.openxmlformats.org/presentationml/2006/main">
+  <p:cSld>
+    <p:spTree>
+      <p:nvGrpSpPr>
+        <p:cNvPr id="1" name=""/>
+        <p:cNvGrpSpPr/>
+        <p:nvPr/>
+      </p:nvGrpSpPr>
+      <p:grpSpPr>
+        <a:xfrm>
+          <a:off x="0" y="0"/>
+          <a:ext cx="0" cy="0"/>
+          <a:chOff x="0" y="0"/>
+          <a:chExt cx="0" cy="0"/>
+        </a:xfrm>
+      </p:grpSpPr>
+      <p:sp>
+        <p:nvSpPr>
+          <p:cNvPr id="4" name="TextBox 3"/>
+          <p:cNvSpPr txBox="1"/>
+          <p:nvPr/>
+        </p:nvSpPr>
+        <p:spPr>
+          <a:xfrm>
+            <a:off x="307445" y="764461"/>
+            <a:ext cx="3533668" cy="2585323"/>
+          </a:xfrm>
+          <a:prstGeom prst="rect">
+            <a:avLst/>
+          </a:prstGeom>
+          <a:noFill/>
+        </p:spPr>
+        <p:txBody>
+          <a:bodyPr wrap="square" rtlCol="0">
+            <a:spAutoFit/>
+          </a:bodyPr>
+          <a:lstStyle/>
+          <a:p>
+            <a:r>
+              <a:rPr lang="en-US" dirty="0" smtClean="0"/>
+              <a:t>32 Accelerometers:</a:t>
+            </a:r>
+          </a:p>
+          <a:p>
+            <a:pPr marL="285750" indent="-285750">
+              <a:buFont typeface="Arial" panose="020B0604020202020204" pitchFamily="34" charset="0"/>
+              <a:buChar char="•"/>
+            </a:pPr>
+            <a:r>
+              <a:rPr lang="en-US" dirty="0" smtClean="0"/>
+              <a:t>20 vertically oriented </a:t>
+            </a:r>
+            <a:r>
+              <a:rPr lang="en-US" dirty="0" err="1" smtClean="0"/>
+              <a:t>accels</a:t>
+            </a:r>
+            <a:endParaRPr lang="en-US" dirty="0" smtClean="0"/>
+          </a:p>
+          <a:p>
+            <a:pPr marL="285750" indent="-285750">
+              <a:buFont typeface="Arial" panose="020B0604020202020204" pitchFamily="34" charset="0"/>
+              <a:buChar char="•"/>
+            </a:pPr>
+            <a:r>
+              <a:rPr lang="en-US" dirty="0"/>
+              <a:t>5</a:t>
+            </a:r>
+            <a:r>
+              <a:rPr lang="en-US" dirty="0" smtClean="0"/>
+              <a:t> transversely oriented </a:t>
+            </a:r>
+            <a:r>
+              <a:rPr lang="en-US" dirty="0" err="1" smtClean="0"/>
+              <a:t>accels</a:t>
+            </a:r>
+            <a:endParaRPr lang="en-US" dirty="0" smtClean="0"/>
+          </a:p>
+          <a:p>
+            <a:pPr marL="285750" indent="-285750">
+              <a:buFont typeface="Arial" panose="020B0604020202020204" pitchFamily="34" charset="0"/>
+              <a:buChar char="•"/>
+            </a:pPr>
+            <a:r>
+              <a:rPr lang="en-US" dirty="0"/>
+              <a:t>7</a:t>
+            </a:r>
+            <a:r>
+              <a:rPr lang="en-US" dirty="0" smtClean="0"/>
+              <a:t> longitudinally oriented </a:t>
+            </a:r>
+            <a:r>
+              <a:rPr lang="en-US" dirty="0" err="1" smtClean="0"/>
+              <a:t>accels</a:t>
+            </a:r>
+            <a:endParaRPr lang="en-US" dirty="0" smtClean="0"/>
+          </a:p>
+          <a:p>
+            <a:r>
+              <a:rPr lang="en-US" dirty="0" smtClean="0"/>
+              <a:t>12 Strain Gauges</a:t>
+            </a:r>
+          </a:p>
+          <a:p>
+            <a:pPr marL="285750" indent="-285750">
+              <a:buFont typeface="Arial" panose="020B0604020202020204" pitchFamily="34" charset="0"/>
+              <a:buChar char="•"/>
+            </a:pPr>
+            <a:r>
+              <a:rPr lang="en-US" dirty="0" smtClean="0"/>
+              <a:t>9 on W-Beams. 3 on Box Girder</a:t>
+            </a:r>
+          </a:p>
+          <a:p>
+            <a:pPr marL="285750" indent="-285750">
+              <a:buFont typeface="Arial" panose="020B0604020202020204" pitchFamily="34" charset="0"/>
+              <a:buChar char="•"/>
+            </a:pPr>
+            <a:endParaRPr lang="en-US" dirty="0" smtClean="0"/>
+          </a:p>
+          <a:p>
+            <a:pPr marL="285750" indent="-285750">
+              <a:buFont typeface="Arial" panose="020B0604020202020204" pitchFamily="34" charset="0"/>
+              <a:buChar char="•"/>
+            </a:pPr>
+            <a:endParaRPr lang="en-US" dirty="0" smtClean="0"/>
+          </a:p>
+          <a:p>
+            <a:endParaRPr lang="en-US" dirty="0"/>
+          </a:p>
+        </p:txBody>
+      </p:sp>
+      <p:sp>
+        <p:nvSpPr>
+          <p:cNvPr id="69" name="TextBox 68"/>
+          <p:cNvSpPr txBox="1"/>
+          <p:nvPr/>
+        </p:nvSpPr>
+        <p:spPr>
+          <a:xfrm>
+            <a:off x="354719" y="240268"/>
+            <a:ext cx="3710162" cy="369332"/>
+          </a:xfrm>
+          <a:prstGeom prst="rect">
+            <a:avLst/>
+          </a:prstGeom>
+          <a:noFill/>
+        </p:spPr>
+        <p:txBody>
+          <a:bodyPr wrap="square" rtlCol="0">
+            <a:spAutoFit/>
+          </a:bodyPr>
+          <a:lstStyle/>
+          <a:p>
+            <a:r>
+              <a:rPr lang="en-US" b="1" dirty="0" smtClean="0"/>
+              <a:t>Instrumentation Plan</a:t>
+            </a:r>
+            <a:endParaRPr lang="en-US" b="1" dirty="0"/>
+          </a:p>
+        </p:txBody>
+      </p:sp>
+      <p:grpSp>
+        <p:nvGrpSpPr>
+          <p:cNvPr id="147" name="Group 146"/>
+          <p:cNvGrpSpPr/>
+          <p:nvPr/>
+        </p:nvGrpSpPr>
+        <p:grpSpPr>
+          <a:xfrm>
+            <a:off x="3810000" y="2590800"/>
+            <a:ext cx="738793" cy="913710"/>
+            <a:chOff x="3528407" y="2590800"/>
+            <a:chExt cx="738793" cy="913710"/>
+          </a:xfrm>
+        </p:grpSpPr>
+        <p:grpSp>
+          <p:nvGrpSpPr>
+            <p:cNvPr id="83" name="Group 82"/>
+            <p:cNvGrpSpPr/>
+            <p:nvPr/>
+          </p:nvGrpSpPr>
+          <p:grpSpPr>
+            <a:xfrm>
+              <a:off x="3601800" y="2590800"/>
+              <a:ext cx="665400" cy="913710"/>
+              <a:chOff x="6400800" y="907088"/>
+              <a:chExt cx="1524000" cy="2214880"/>
+            </a:xfrm>
+          </p:grpSpPr>
+          <p:sp>
+            <p:nvSpPr>
+              <p:cNvPr id="84" name="Rectangle 83"/>
+              <p:cNvSpPr/>
+              <p:nvPr/>
+            </p:nvSpPr>
+            <p:spPr>
+              <a:xfrm>
+                <a:off x="6400800" y="907088"/>
+                <a:ext cx="1524000" cy="152400"/>
+              </a:xfrm>
+              <a:prstGeom prst="rect">
+                <a:avLst/>
+              </a:prstGeom>
+              <a:solidFill>
+                <a:schemeClr val="accent1">
+                  <a:lumMod val="20000"/>
+                  <a:lumOff val="80000"/>
+                </a:schemeClr>
+              </a:solidFill>
+            </p:spPr>
+            <p:style>
+              <a:lnRef idx="2">
+                <a:schemeClr val="accent1">
+                  <a:shade val="50000"/>
+                </a:schemeClr>
+              </a:lnRef>
+              <a:fillRef idx="1">
+                <a:schemeClr val="accent1"/>
+              </a:fillRef>
+              <a:effectRef idx="0">
+                <a:schemeClr val="accent1"/>
+              </a:effectRef>
+              <a:fontRef idx="minor">
+                <a:schemeClr val="lt1"/>
+              </a:fontRef>
+            </p:style>
+            <p:txBody>
+              <a:bodyPr rtlCol="0" anchor="ctr"/>
+              <a:lstStyle/>
+              <a:p>
+                <a:pPr algn="ctr"/>
+                <a:endParaRPr lang="en-US"/>
+              </a:p>
+            </p:txBody>
+          </p:sp>
+          <p:sp>
+            <p:nvSpPr>
+              <p:cNvPr id="85" name="Rectangle 84"/>
+              <p:cNvSpPr/>
+              <p:nvPr/>
+            </p:nvSpPr>
+            <p:spPr>
+              <a:xfrm>
+                <a:off x="6400800" y="2812088"/>
+                <a:ext cx="1524000" cy="152400"/>
+              </a:xfrm>
+              <a:prstGeom prst="rect">
+                <a:avLst/>
+              </a:prstGeom>
+              <a:solidFill>
+                <a:schemeClr val="accent1">
+                  <a:lumMod val="20000"/>
+                  <a:lumOff val="80000"/>
+                </a:schemeClr>
+              </a:solidFill>
+            </p:spPr>
+            <p:style>
+              <a:lnRef idx="2">
+                <a:schemeClr val="accent1">
+                  <a:shade val="50000"/>
+                </a:schemeClr>
+              </a:lnRef>
+              <a:fillRef idx="1">
+                <a:schemeClr val="accent1"/>
+              </a:fillRef>
+              <a:effectRef idx="0">
+                <a:schemeClr val="accent1"/>
+              </a:effectRef>
+              <a:fontRef idx="minor">
+                <a:schemeClr val="lt1"/>
+              </a:fontRef>
+            </p:style>
+            <p:txBody>
+              <a:bodyPr rtlCol="0" anchor="ctr"/>
+              <a:lstStyle/>
+              <a:p>
+                <a:pPr algn="ctr"/>
+                <a:endParaRPr lang="en-US"/>
+              </a:p>
+            </p:txBody>
+          </p:sp>
+          <p:sp>
+            <p:nvSpPr>
+              <p:cNvPr id="86" name="Rectangle 85"/>
+              <p:cNvSpPr/>
+              <p:nvPr/>
+            </p:nvSpPr>
+            <p:spPr>
+              <a:xfrm>
+                <a:off x="7086600" y="1059488"/>
+                <a:ext cx="152400" cy="1752600"/>
+              </a:xfrm>
+              <a:prstGeom prst="rect">
+                <a:avLst/>
+              </a:prstGeom>
+              <a:solidFill>
+                <a:schemeClr val="accent1">
+                  <a:lumMod val="20000"/>
+                  <a:lumOff val="80000"/>
+                </a:schemeClr>
+              </a:solidFill>
+            </p:spPr>
+            <p:style>
+              <a:lnRef idx="2">
+                <a:schemeClr val="accent1">
+                  <a:shade val="50000"/>
+                </a:schemeClr>
+              </a:lnRef>
+              <a:fillRef idx="1">
+                <a:schemeClr val="accent1"/>
+              </a:fillRef>
+              <a:effectRef idx="0">
+                <a:schemeClr val="accent1"/>
+              </a:effectRef>
+              <a:fontRef idx="minor">
+                <a:schemeClr val="lt1"/>
+              </a:fontRef>
+            </p:style>
+            <p:txBody>
+              <a:bodyPr rtlCol="0" anchor="ctr"/>
+              <a:lstStyle/>
+              <a:p>
+                <a:pPr algn="ctr"/>
+                <a:endParaRPr lang="en-US"/>
+              </a:p>
+            </p:txBody>
+          </p:sp>
+          <p:sp>
+            <p:nvSpPr>
+              <p:cNvPr id="88" name="Rectangle 87"/>
+              <p:cNvSpPr/>
+              <p:nvPr/>
+            </p:nvSpPr>
+            <p:spPr>
+              <a:xfrm>
+                <a:off x="7093345" y="2971800"/>
+                <a:ext cx="152400" cy="150168"/>
+              </a:xfrm>
+              <a:prstGeom prst="rect">
+                <a:avLst/>
+              </a:prstGeom>
+              <a:solidFill>
+                <a:schemeClr val="accent2"/>
+              </a:solidFill>
+              <a:ln>
+                <a:solidFill>
+                  <a:schemeClr val="accent2">
+                    <a:lumMod val="50000"/>
+                  </a:schemeClr>
+                </a:solidFill>
+              </a:ln>
+            </p:spPr>
+            <p:style>
+              <a:lnRef idx="2">
+                <a:schemeClr val="accent1">
+                  <a:shade val="50000"/>
+                </a:schemeClr>
+              </a:lnRef>
+              <a:fillRef idx="1">
+                <a:schemeClr val="accent1"/>
+              </a:fillRef>
+              <a:effectRef idx="0">
+                <a:schemeClr val="accent1"/>
+              </a:effectRef>
+              <a:fontRef idx="minor">
+                <a:schemeClr val="lt1"/>
+              </a:fontRef>
+            </p:style>
+            <p:txBody>
+              <a:bodyPr rtlCol="0" anchor="ctr"/>
+              <a:lstStyle/>
+              <a:p>
+                <a:pPr algn="ctr"/>
+                <a:endParaRPr lang="en-US"/>
+              </a:p>
+            </p:txBody>
+          </p:sp>
+        </p:grpSp>
+        <p:sp>
+          <p:nvSpPr>
+            <p:cNvPr id="89" name="Oval 88"/>
+            <p:cNvSpPr/>
+            <p:nvPr/>
+          </p:nvSpPr>
+          <p:spPr>
+            <a:xfrm>
+              <a:off x="3528407" y="2933931"/>
+              <a:ext cx="228600" cy="225417"/>
+            </a:xfrm>
+            <a:prstGeom prst="ellipse">
+              <a:avLst/>
+            </a:prstGeom>
+            <a:noFill/>
+          </p:spPr>
+          <p:style>
+            <a:lnRef idx="2">
+              <a:schemeClr val="accent1">
+                <a:shade val="50000"/>
+              </a:schemeClr>
+            </a:lnRef>
+            <a:fillRef idx="1">
+              <a:schemeClr val="accent1"/>
+            </a:fillRef>
+            <a:effectRef idx="0">
+              <a:schemeClr val="accent1"/>
+            </a:effectRef>
+            <a:fontRef idx="minor">
+              <a:schemeClr val="lt1"/>
+            </a:fontRef>
+          </p:style>
+          <p:txBody>
+            <a:bodyPr rtlCol="0" anchor="ctr"/>
+            <a:lstStyle/>
+            <a:p>
+              <a:pPr algn="ctr"/>
+              <a:endParaRPr lang="en-US"/>
+            </a:p>
+          </p:txBody>
+        </p:sp>
+      </p:grpSp>
+      <p:grpSp>
+        <p:nvGrpSpPr>
+          <p:cNvPr id="146" name="Group 145"/>
+          <p:cNvGrpSpPr/>
+          <p:nvPr/>
+        </p:nvGrpSpPr>
+        <p:grpSpPr>
+          <a:xfrm>
+            <a:off x="2995007" y="2590800"/>
+            <a:ext cx="753685" cy="913710"/>
+            <a:chOff x="2537807" y="2590800"/>
+            <a:chExt cx="753685" cy="913710"/>
+          </a:xfrm>
+        </p:grpSpPr>
+        <p:grpSp>
+          <p:nvGrpSpPr>
+            <p:cNvPr id="75" name="Group 74"/>
+            <p:cNvGrpSpPr/>
+            <p:nvPr/>
+          </p:nvGrpSpPr>
+          <p:grpSpPr>
+            <a:xfrm>
+              <a:off x="2626092" y="2590800"/>
+              <a:ext cx="665400" cy="913710"/>
+              <a:chOff x="6400800" y="907088"/>
+              <a:chExt cx="1524000" cy="2214880"/>
+            </a:xfrm>
+          </p:grpSpPr>
+          <p:sp>
+            <p:nvSpPr>
+              <p:cNvPr id="76" name="Rectangle 75"/>
+              <p:cNvSpPr/>
+              <p:nvPr/>
+            </p:nvSpPr>
+            <p:spPr>
+              <a:xfrm>
+                <a:off x="6400800" y="907088"/>
+                <a:ext cx="1524000" cy="152400"/>
+              </a:xfrm>
+              <a:prstGeom prst="rect">
+                <a:avLst/>
+              </a:prstGeom>
+              <a:solidFill>
+                <a:schemeClr val="accent1">
+                  <a:lumMod val="20000"/>
+                  <a:lumOff val="80000"/>
+                </a:schemeClr>
+              </a:solidFill>
+            </p:spPr>
+            <p:style>
+              <a:lnRef idx="2">
+                <a:schemeClr val="accent1">
+                  <a:shade val="50000"/>
+                </a:schemeClr>
+              </a:lnRef>
+              <a:fillRef idx="1">
+                <a:schemeClr val="accent1"/>
+              </a:fillRef>
+              <a:effectRef idx="0">
+                <a:schemeClr val="accent1"/>
+              </a:effectRef>
+              <a:fontRef idx="minor">
+                <a:schemeClr val="lt1"/>
+              </a:fontRef>
+            </p:style>
+            <p:txBody>
+              <a:bodyPr rtlCol="0" anchor="ctr"/>
+              <a:lstStyle/>
+              <a:p>
+                <a:pPr algn="ctr"/>
+                <a:endParaRPr lang="en-US"/>
+              </a:p>
+            </p:txBody>
+          </p:sp>
+          <p:sp>
+            <p:nvSpPr>
+              <p:cNvPr id="77" name="Rectangle 76"/>
+              <p:cNvSpPr/>
+              <p:nvPr/>
+            </p:nvSpPr>
+            <p:spPr>
+              <a:xfrm>
+                <a:off x="6400800" y="2812088"/>
+                <a:ext cx="1524000" cy="152400"/>
+              </a:xfrm>
+              <a:prstGeom prst="rect">
+                <a:avLst/>
+              </a:prstGeom>
+              <a:solidFill>
+                <a:schemeClr val="accent1">
+                  <a:lumMod val="20000"/>
+                  <a:lumOff val="80000"/>
+                </a:schemeClr>
+              </a:solidFill>
+            </p:spPr>
+            <p:style>
+              <a:lnRef idx="2">
+                <a:schemeClr val="accent1">
+                  <a:shade val="50000"/>
+                </a:schemeClr>
+              </a:lnRef>
+              <a:fillRef idx="1">
+                <a:schemeClr val="accent1"/>
+              </a:fillRef>
+              <a:effectRef idx="0">
+                <a:schemeClr val="accent1"/>
+              </a:effectRef>
+              <a:fontRef idx="minor">
+                <a:schemeClr val="lt1"/>
+              </a:fontRef>
+            </p:style>
+            <p:txBody>
+              <a:bodyPr rtlCol="0" anchor="ctr"/>
+              <a:lstStyle/>
+              <a:p>
+                <a:pPr algn="ctr"/>
+                <a:endParaRPr lang="en-US"/>
+              </a:p>
+            </p:txBody>
+          </p:sp>
+          <p:sp>
+            <p:nvSpPr>
+              <p:cNvPr id="78" name="Rectangle 77"/>
+              <p:cNvSpPr/>
+              <p:nvPr/>
+            </p:nvSpPr>
+            <p:spPr>
+              <a:xfrm>
+                <a:off x="7086600" y="1059488"/>
+                <a:ext cx="152400" cy="1752600"/>
+              </a:xfrm>
+              <a:prstGeom prst="rect">
+                <a:avLst/>
+              </a:prstGeom>
+              <a:solidFill>
+                <a:schemeClr val="accent1">
+                  <a:lumMod val="20000"/>
+                  <a:lumOff val="80000"/>
+                </a:schemeClr>
+              </a:solidFill>
+            </p:spPr>
+            <p:style>
+              <a:lnRef idx="2">
+                <a:schemeClr val="accent1">
+                  <a:shade val="50000"/>
+                </a:schemeClr>
+              </a:lnRef>
+              <a:fillRef idx="1">
+                <a:schemeClr val="accent1"/>
+              </a:fillRef>
+              <a:effectRef idx="0">
+                <a:schemeClr val="accent1"/>
+              </a:effectRef>
+              <a:fontRef idx="minor">
+                <a:schemeClr val="lt1"/>
+              </a:fontRef>
+            </p:style>
+            <p:txBody>
+              <a:bodyPr rtlCol="0" anchor="ctr"/>
+              <a:lstStyle/>
+              <a:p>
+                <a:pPr algn="ctr"/>
+                <a:endParaRPr lang="en-US"/>
+              </a:p>
+            </p:txBody>
+          </p:sp>
+          <p:sp>
+            <p:nvSpPr>
+              <p:cNvPr id="81" name="Rectangle 80"/>
+              <p:cNvSpPr/>
+              <p:nvPr/>
+            </p:nvSpPr>
+            <p:spPr>
+              <a:xfrm>
+                <a:off x="7239000" y="1671320"/>
+                <a:ext cx="152400" cy="150168"/>
+              </a:xfrm>
+              <a:prstGeom prst="rect">
+                <a:avLst/>
+              </a:prstGeom>
+              <a:solidFill>
+                <a:schemeClr val="accent2"/>
+              </a:solidFill>
+              <a:ln>
+                <a:solidFill>
+                  <a:schemeClr val="accent2">
+                    <a:lumMod val="50000"/>
+                  </a:schemeClr>
+                </a:solidFill>
+              </a:ln>
+            </p:spPr>
+            <p:style>
+              <a:lnRef idx="2">
+                <a:schemeClr val="accent1">
+                  <a:shade val="50000"/>
+                </a:schemeClr>
+              </a:lnRef>
+              <a:fillRef idx="1">
+                <a:schemeClr val="accent1"/>
+              </a:fillRef>
+              <a:effectRef idx="0">
+                <a:schemeClr val="accent1"/>
+              </a:effectRef>
+              <a:fontRef idx="minor">
+                <a:schemeClr val="lt1"/>
+              </a:fontRef>
+            </p:style>
+            <p:txBody>
+              <a:bodyPr rtlCol="0" anchor="ctr"/>
+              <a:lstStyle/>
+              <a:p>
+                <a:pPr algn="ctr"/>
+                <a:endParaRPr lang="en-US"/>
+              </a:p>
+            </p:txBody>
+          </p:sp>
+          <p:sp>
+            <p:nvSpPr>
+              <p:cNvPr id="82" name="Rectangle 81"/>
+              <p:cNvSpPr/>
+              <p:nvPr/>
+            </p:nvSpPr>
+            <p:spPr>
+              <a:xfrm>
+                <a:off x="7093345" y="2971800"/>
+                <a:ext cx="152400" cy="150168"/>
+              </a:xfrm>
+              <a:prstGeom prst="rect">
+                <a:avLst/>
+              </a:prstGeom>
+              <a:solidFill>
+                <a:schemeClr val="accent2"/>
+              </a:solidFill>
+              <a:ln>
+                <a:solidFill>
+                  <a:schemeClr val="accent2">
+                    <a:lumMod val="50000"/>
+                  </a:schemeClr>
+                </a:solidFill>
+              </a:ln>
+            </p:spPr>
+            <p:style>
+              <a:lnRef idx="2">
+                <a:schemeClr val="accent1">
+                  <a:shade val="50000"/>
+                </a:schemeClr>
+              </a:lnRef>
+              <a:fillRef idx="1">
+                <a:schemeClr val="accent1"/>
+              </a:fillRef>
+              <a:effectRef idx="0">
+                <a:schemeClr val="accent1"/>
+              </a:effectRef>
+              <a:fontRef idx="minor">
+                <a:schemeClr val="lt1"/>
+              </a:fontRef>
+            </p:style>
+            <p:txBody>
+              <a:bodyPr rtlCol="0" anchor="ctr"/>
+              <a:lstStyle/>
+              <a:p>
+                <a:pPr algn="ctr"/>
+                <a:endParaRPr lang="en-US"/>
+              </a:p>
+            </p:txBody>
+          </p:sp>
+        </p:grpSp>
+        <p:sp>
+          <p:nvSpPr>
+            <p:cNvPr id="90" name="Oval 89"/>
+            <p:cNvSpPr/>
+            <p:nvPr/>
+          </p:nvSpPr>
+          <p:spPr>
+            <a:xfrm>
+              <a:off x="2537807" y="2933931"/>
+              <a:ext cx="228600" cy="225417"/>
+            </a:xfrm>
+            <a:prstGeom prst="ellipse">
+              <a:avLst/>
+            </a:prstGeom>
+            <a:noFill/>
+            <a:ln>
+              <a:solidFill>
+                <a:srgbClr val="00B050"/>
+              </a:solidFill>
+            </a:ln>
+          </p:spPr>
+          <p:style>
+            <a:lnRef idx="2">
+              <a:schemeClr val="accent1">
+                <a:shade val="50000"/>
+              </a:schemeClr>
+            </a:lnRef>
+            <a:fillRef idx="1">
+              <a:schemeClr val="accent1"/>
+            </a:fillRef>
+            <a:effectRef idx="0">
+              <a:schemeClr val="accent1"/>
+            </a:effectRef>
+            <a:fontRef idx="minor">
+              <a:schemeClr val="lt1"/>
+            </a:fontRef>
+          </p:style>
+          <p:txBody>
+            <a:bodyPr rtlCol="0" anchor="ctr"/>
+            <a:lstStyle/>
+            <a:p>
+              <a:pPr algn="ctr"/>
+              <a:endParaRPr lang="en-US"/>
+            </a:p>
+          </p:txBody>
+        </p:sp>
+      </p:grpSp>
+      <p:grpSp>
+        <p:nvGrpSpPr>
+          <p:cNvPr id="145" name="Group 144"/>
+          <p:cNvGrpSpPr/>
+          <p:nvPr/>
+        </p:nvGrpSpPr>
+        <p:grpSpPr>
+          <a:xfrm>
+            <a:off x="2209800" y="2590800"/>
+            <a:ext cx="762000" cy="913710"/>
+            <a:chOff x="815887" y="2589784"/>
+            <a:chExt cx="762000" cy="913710"/>
+          </a:xfrm>
+        </p:grpSpPr>
+        <p:sp>
+          <p:nvSpPr>
+            <p:cNvPr id="91" name="Multiply 90"/>
+            <p:cNvSpPr/>
+            <p:nvPr/>
+          </p:nvSpPr>
+          <p:spPr>
+            <a:xfrm>
+              <a:off x="815887" y="2970784"/>
+              <a:ext cx="202398" cy="189161"/>
+            </a:xfrm>
+            <a:prstGeom prst="mathMultiply">
+              <a:avLst/>
+            </a:prstGeom>
+            <a:solidFill>
+              <a:srgbClr val="FF0000"/>
+            </a:solidFill>
+            <a:ln>
+              <a:solidFill>
+                <a:srgbClr val="C00000"/>
+              </a:solidFill>
+            </a:ln>
+          </p:spPr>
+          <p:style>
+            <a:lnRef idx="2">
+              <a:schemeClr val="accent1">
+                <a:shade val="50000"/>
+              </a:schemeClr>
+            </a:lnRef>
+            <a:fillRef idx="1">
+              <a:schemeClr val="accent1"/>
+            </a:fillRef>
+            <a:effectRef idx="0">
+              <a:schemeClr val="accent1"/>
+            </a:effectRef>
+            <a:fontRef idx="minor">
+              <a:schemeClr val="lt1"/>
+            </a:fontRef>
+          </p:style>
+          <p:txBody>
+            <a:bodyPr rtlCol="0" anchor="ctr"/>
+            <a:lstStyle/>
+            <a:p>
+              <a:pPr algn="ctr"/>
+              <a:endParaRPr lang="en-US"/>
+            </a:p>
+          </p:txBody>
+        </p:sp>
+        <p:grpSp>
+          <p:nvGrpSpPr>
+            <p:cNvPr id="92" name="Group 91"/>
+            <p:cNvGrpSpPr/>
+            <p:nvPr/>
+          </p:nvGrpSpPr>
+          <p:grpSpPr>
+            <a:xfrm>
+              <a:off x="912487" y="2589784"/>
+              <a:ext cx="665400" cy="913710"/>
+              <a:chOff x="6400800" y="907088"/>
+              <a:chExt cx="1524000" cy="2214880"/>
+            </a:xfrm>
+          </p:grpSpPr>
+          <p:sp>
+            <p:nvSpPr>
+              <p:cNvPr id="93" name="Rectangle 92"/>
+              <p:cNvSpPr/>
+              <p:nvPr/>
+            </p:nvSpPr>
+            <p:spPr>
+              <a:xfrm>
+                <a:off x="6400800" y="907088"/>
+                <a:ext cx="1524000" cy="152400"/>
+              </a:xfrm>
+              <a:prstGeom prst="rect">
+                <a:avLst/>
+              </a:prstGeom>
+              <a:solidFill>
+                <a:schemeClr val="accent1">
+                  <a:lumMod val="20000"/>
+                  <a:lumOff val="80000"/>
+                </a:schemeClr>
+              </a:solidFill>
+            </p:spPr>
+            <p:style>
+              <a:lnRef idx="2">
+                <a:schemeClr val="accent1">
+                  <a:shade val="50000"/>
+                </a:schemeClr>
+              </a:lnRef>
+              <a:fillRef idx="1">
+                <a:schemeClr val="accent1"/>
+              </a:fillRef>
+              <a:effectRef idx="0">
+                <a:schemeClr val="accent1"/>
+              </a:effectRef>
+              <a:fontRef idx="minor">
+                <a:schemeClr val="lt1"/>
+              </a:fontRef>
+            </p:style>
+            <p:txBody>
+              <a:bodyPr rtlCol="0" anchor="ctr"/>
+              <a:lstStyle/>
+              <a:p>
+                <a:pPr algn="ctr"/>
+                <a:endParaRPr lang="en-US"/>
+              </a:p>
+            </p:txBody>
+          </p:sp>
+          <p:sp>
+            <p:nvSpPr>
+              <p:cNvPr id="94" name="Rectangle 93"/>
+              <p:cNvSpPr/>
+              <p:nvPr/>
+            </p:nvSpPr>
+            <p:spPr>
+              <a:xfrm>
+                <a:off x="6400800" y="2812088"/>
+                <a:ext cx="1524000" cy="152400"/>
+              </a:xfrm>
+              <a:prstGeom prst="rect">
+                <a:avLst/>
+              </a:prstGeom>
+              <a:solidFill>
+                <a:schemeClr val="accent1">
+                  <a:lumMod val="20000"/>
+                  <a:lumOff val="80000"/>
+                </a:schemeClr>
+              </a:solidFill>
+            </p:spPr>
+            <p:style>
+              <a:lnRef idx="2">
+                <a:schemeClr val="accent1">
+                  <a:shade val="50000"/>
+                </a:schemeClr>
+              </a:lnRef>
+              <a:fillRef idx="1">
+                <a:schemeClr val="accent1"/>
+              </a:fillRef>
+              <a:effectRef idx="0">
+                <a:schemeClr val="accent1"/>
+              </a:effectRef>
+              <a:fontRef idx="minor">
+                <a:schemeClr val="lt1"/>
+              </a:fontRef>
+            </p:style>
+            <p:txBody>
+              <a:bodyPr rtlCol="0" anchor="ctr"/>
+              <a:lstStyle/>
+              <a:p>
+                <a:pPr algn="ctr"/>
+                <a:endParaRPr lang="en-US"/>
+              </a:p>
+            </p:txBody>
+          </p:sp>
+          <p:sp>
+            <p:nvSpPr>
+              <p:cNvPr id="95" name="Rectangle 94"/>
+              <p:cNvSpPr/>
+              <p:nvPr/>
+            </p:nvSpPr>
+            <p:spPr>
+              <a:xfrm>
+                <a:off x="7086600" y="1059488"/>
+                <a:ext cx="152400" cy="1752600"/>
+              </a:xfrm>
+              <a:prstGeom prst="rect">
+                <a:avLst/>
+              </a:prstGeom>
+              <a:solidFill>
+                <a:schemeClr val="accent1">
+                  <a:lumMod val="20000"/>
+                  <a:lumOff val="80000"/>
+                </a:schemeClr>
+              </a:solidFill>
+            </p:spPr>
+            <p:style>
+              <a:lnRef idx="2">
+                <a:schemeClr val="accent1">
+                  <a:shade val="50000"/>
+                </a:schemeClr>
+              </a:lnRef>
+              <a:fillRef idx="1">
+                <a:schemeClr val="accent1"/>
+              </a:fillRef>
+              <a:effectRef idx="0">
+                <a:schemeClr val="accent1"/>
+              </a:effectRef>
+              <a:fontRef idx="minor">
+                <a:schemeClr val="lt1"/>
+              </a:fontRef>
+            </p:style>
+            <p:txBody>
+              <a:bodyPr rtlCol="0" anchor="ctr"/>
+              <a:lstStyle/>
+              <a:p>
+                <a:pPr algn="ctr"/>
+                <a:endParaRPr lang="en-US"/>
+              </a:p>
+            </p:txBody>
+          </p:sp>
+          <p:sp>
+            <p:nvSpPr>
+              <p:cNvPr id="97" name="Rectangle 96"/>
+              <p:cNvSpPr/>
+              <p:nvPr/>
+            </p:nvSpPr>
+            <p:spPr>
+              <a:xfrm>
+                <a:off x="7093345" y="2971800"/>
+                <a:ext cx="152400" cy="150168"/>
+              </a:xfrm>
+              <a:prstGeom prst="rect">
+                <a:avLst/>
+              </a:prstGeom>
+              <a:solidFill>
+                <a:schemeClr val="accent2"/>
+              </a:solidFill>
+              <a:ln>
+                <a:solidFill>
+                  <a:schemeClr val="accent2">
+                    <a:lumMod val="50000"/>
+                  </a:schemeClr>
+                </a:solidFill>
+              </a:ln>
+            </p:spPr>
+            <p:style>
+              <a:lnRef idx="2">
+                <a:schemeClr val="accent1">
+                  <a:shade val="50000"/>
+                </a:schemeClr>
+              </a:lnRef>
+              <a:fillRef idx="1">
+                <a:schemeClr val="accent1"/>
+              </a:fillRef>
+              <a:effectRef idx="0">
+                <a:schemeClr val="accent1"/>
+              </a:effectRef>
+              <a:fontRef idx="minor">
+                <a:schemeClr val="lt1"/>
+              </a:fontRef>
+            </p:style>
+            <p:txBody>
+              <a:bodyPr rtlCol="0" anchor="ctr"/>
+              <a:lstStyle/>
+              <a:p>
+                <a:pPr algn="ctr"/>
+                <a:endParaRPr lang="en-US"/>
+              </a:p>
+            </p:txBody>
+          </p:sp>
+        </p:grpSp>
+      </p:grpSp>
+      <p:sp>
+        <p:nvSpPr>
+          <p:cNvPr id="5" name="Rectangle 4"/>
+          <p:cNvSpPr/>
+          <p:nvPr/>
+        </p:nvSpPr>
+        <p:spPr>
+          <a:xfrm>
+            <a:off x="848922" y="3839446"/>
+            <a:ext cx="7471852" cy="2770332"/>
+          </a:xfrm>
+          <a:prstGeom prst="rect">
+            <a:avLst/>
+          </a:prstGeom>
+          <a:solidFill>
+            <a:srgbClr val="F6F5EE"/>
+          </a:solidFill>
+          <a:ln w="12700">
+            <a:solidFill>
+              <a:srgbClr val="73614F"/>
+            </a:solidFill>
+            <a:prstDash val="lgDash"/>
+          </a:ln>
+        </p:spPr>
+        <p:style>
+          <a:lnRef idx="2">
+            <a:schemeClr val="accent1">
+              <a:shade val="50000"/>
+            </a:schemeClr>
+          </a:lnRef>
+          <a:fillRef idx="1">
+            <a:schemeClr val="accent1"/>
+          </a:fillRef>
+          <a:effectRef idx="0">
+            <a:schemeClr val="accent1"/>
+          </a:effectRef>
+          <a:fontRef idx="minor">
+            <a:schemeClr val="lt1"/>
+          </a:fontRef>
+        </p:style>
+        <p:txBody>
+          <a:bodyPr rtlCol="0" anchor="ctr"/>
+          <a:lstStyle/>
+          <a:p>
+            <a:pPr algn="ctr"/>
+            <a:endParaRPr lang="en-US"/>
+          </a:p>
+        </p:txBody>
+      </p:sp>
+      <p:sp>
+        <p:nvSpPr>
+          <p:cNvPr id="8" name="Rectangle 7"/>
+          <p:cNvSpPr/>
+          <p:nvPr/>
+        </p:nvSpPr>
+        <p:spPr>
+          <a:xfrm>
+            <a:off x="762000" y="3776392"/>
+            <a:ext cx="337330" cy="2900461"/>
+          </a:xfrm>
+          <a:prstGeom prst="rect">
+            <a:avLst/>
+          </a:prstGeom>
+          <a:solidFill>
+            <a:schemeClr val="accent3">
+              <a:lumMod val="20000"/>
+              <a:lumOff val="80000"/>
+            </a:schemeClr>
+          </a:solidFill>
+          <a:ln w="12700">
+            <a:solidFill>
+              <a:schemeClr val="accent3">
+                <a:lumMod val="50000"/>
+              </a:schemeClr>
+            </a:solidFill>
+          </a:ln>
+        </p:spPr>
+        <p:style>
+          <a:lnRef idx="2">
+            <a:schemeClr val="accent1">
+              <a:shade val="50000"/>
+            </a:schemeClr>
+          </a:lnRef>
+          <a:fillRef idx="1">
+            <a:schemeClr val="accent1"/>
+          </a:fillRef>
+          <a:effectRef idx="0">
+            <a:schemeClr val="accent1"/>
+          </a:effectRef>
+          <a:fontRef idx="minor">
+            <a:schemeClr val="lt1"/>
+          </a:fontRef>
+        </p:style>
+        <p:txBody>
+          <a:bodyPr rtlCol="0" anchor="ctr"/>
+          <a:lstStyle/>
+          <a:p>
+            <a:pPr algn="ctr"/>
+            <a:endParaRPr lang="en-US"/>
+          </a:p>
+        </p:txBody>
+      </p:sp>
+      <p:sp>
+        <p:nvSpPr>
+          <p:cNvPr id="6" name="Rectangle 5"/>
+          <p:cNvSpPr/>
+          <p:nvPr/>
+        </p:nvSpPr>
+        <p:spPr>
+          <a:xfrm>
+            <a:off x="4438893" y="3776392"/>
+            <a:ext cx="337330" cy="2900461"/>
+          </a:xfrm>
+          <a:prstGeom prst="rect">
+            <a:avLst/>
+          </a:prstGeom>
+          <a:solidFill>
+            <a:schemeClr val="accent3">
+              <a:lumMod val="20000"/>
+              <a:lumOff val="80000"/>
+            </a:schemeClr>
+          </a:solidFill>
+          <a:ln w="12700">
+            <a:solidFill>
+              <a:schemeClr val="accent3">
+                <a:lumMod val="50000"/>
+              </a:schemeClr>
+            </a:solidFill>
+          </a:ln>
+        </p:spPr>
+        <p:style>
+          <a:lnRef idx="2">
+            <a:schemeClr val="accent1">
+              <a:shade val="50000"/>
+            </a:schemeClr>
+          </a:lnRef>
+          <a:fillRef idx="1">
+            <a:schemeClr val="accent1"/>
+          </a:fillRef>
+          <a:effectRef idx="0">
+            <a:schemeClr val="accent1"/>
+          </a:effectRef>
+          <a:fontRef idx="minor">
+            <a:schemeClr val="lt1"/>
+          </a:fontRef>
+        </p:style>
+        <p:txBody>
+          <a:bodyPr rtlCol="0" anchor="ctr"/>
+          <a:lstStyle/>
+          <a:p>
+            <a:pPr algn="ctr"/>
+            <a:endParaRPr lang="en-US"/>
+          </a:p>
+        </p:txBody>
+      </p:sp>
+      <p:sp>
+        <p:nvSpPr>
+          <p:cNvPr id="7" name="Rectangle 6"/>
+          <p:cNvSpPr/>
+          <p:nvPr/>
+        </p:nvSpPr>
+        <p:spPr>
+          <a:xfrm>
+            <a:off x="8082053" y="3776392"/>
+            <a:ext cx="337330" cy="2900461"/>
+          </a:xfrm>
+          <a:prstGeom prst="rect">
+            <a:avLst/>
+          </a:prstGeom>
+          <a:solidFill>
+            <a:schemeClr val="accent3">
+              <a:lumMod val="20000"/>
+              <a:lumOff val="80000"/>
+            </a:schemeClr>
+          </a:solidFill>
+          <a:ln w="12700">
+            <a:solidFill>
+              <a:schemeClr val="accent3">
+                <a:lumMod val="50000"/>
+              </a:schemeClr>
+            </a:solidFill>
+          </a:ln>
+        </p:spPr>
+        <p:style>
+          <a:lnRef idx="2">
+            <a:schemeClr val="accent1">
+              <a:shade val="50000"/>
+            </a:schemeClr>
+          </a:lnRef>
+          <a:fillRef idx="1">
+            <a:schemeClr val="accent1"/>
+          </a:fillRef>
+          <a:effectRef idx="0">
+            <a:schemeClr val="accent1"/>
+          </a:effectRef>
+          <a:fontRef idx="minor">
+            <a:schemeClr val="lt1"/>
+          </a:fontRef>
+        </p:style>
+        <p:txBody>
+          <a:bodyPr rtlCol="0" anchor="ctr"/>
+          <a:lstStyle/>
+          <a:p>
+            <a:pPr algn="ctr"/>
+            <a:endParaRPr lang="en-US"/>
+          </a:p>
+        </p:txBody>
+      </p:sp>
+      <p:sp>
+        <p:nvSpPr>
+          <p:cNvPr id="50" name="Rectangle 49"/>
+          <p:cNvSpPr/>
+          <p:nvPr/>
+        </p:nvSpPr>
+        <p:spPr>
+          <a:xfrm>
+            <a:off x="974518" y="3902499"/>
+            <a:ext cx="7286320" cy="113496"/>
+          </a:xfrm>
+          <a:prstGeom prst="rect">
+            <a:avLst/>
+          </a:prstGeom>
+          <a:solidFill>
+            <a:schemeClr val="accent1">
+              <a:lumMod val="60000"/>
+              <a:lumOff val="40000"/>
+              <a:alpha val="47000"/>
+            </a:schemeClr>
+          </a:solidFill>
+          <a:ln w="12700">
+            <a:solidFill>
+              <a:schemeClr val="tx2">
+                <a:lumMod val="50000"/>
+              </a:schemeClr>
+            </a:solidFill>
+          </a:ln>
+        </p:spPr>
+        <p:style>
+          <a:lnRef idx="2">
+            <a:schemeClr val="accent1">
+              <a:shade val="50000"/>
+            </a:schemeClr>
+          </a:lnRef>
+          <a:fillRef idx="1">
+            <a:schemeClr val="accent1"/>
+          </a:fillRef>
+          <a:effectRef idx="0">
+            <a:schemeClr val="accent1"/>
+          </a:effectRef>
+          <a:fontRef idx="minor">
+            <a:schemeClr val="lt1"/>
+          </a:fontRef>
+        </p:style>
+        <p:txBody>
+          <a:bodyPr rtlCol="0" anchor="ctr"/>
+          <a:lstStyle/>
+          <a:p>
+            <a:pPr algn="ctr"/>
+            <a:endParaRPr lang="en-US"/>
+          </a:p>
+        </p:txBody>
+      </p:sp>
+      <p:sp>
+        <p:nvSpPr>
+          <p:cNvPr id="49" name="Rectangle 48"/>
+          <p:cNvSpPr/>
+          <p:nvPr/>
+        </p:nvSpPr>
+        <p:spPr>
+          <a:xfrm>
+            <a:off x="974518" y="6424640"/>
+            <a:ext cx="7286320" cy="113496"/>
+          </a:xfrm>
+          <a:prstGeom prst="rect">
+            <a:avLst/>
+          </a:prstGeom>
+          <a:solidFill>
+            <a:schemeClr val="accent1">
+              <a:lumMod val="60000"/>
+              <a:lumOff val="40000"/>
+              <a:alpha val="47000"/>
+            </a:schemeClr>
+          </a:solidFill>
+          <a:ln w="12700">
+            <a:solidFill>
+              <a:schemeClr val="tx2">
+                <a:lumMod val="50000"/>
+              </a:schemeClr>
+            </a:solidFill>
+          </a:ln>
+        </p:spPr>
+        <p:style>
+          <a:lnRef idx="2">
+            <a:schemeClr val="accent1">
+              <a:shade val="50000"/>
+            </a:schemeClr>
+          </a:lnRef>
+          <a:fillRef idx="1">
+            <a:schemeClr val="accent1"/>
+          </a:fillRef>
+          <a:effectRef idx="0">
+            <a:schemeClr val="accent1"/>
+          </a:effectRef>
+          <a:fontRef idx="minor">
+            <a:schemeClr val="lt1"/>
+          </a:fontRef>
+        </p:style>
+        <p:txBody>
+          <a:bodyPr rtlCol="0" anchor="ctr"/>
+          <a:lstStyle/>
+          <a:p>
+            <a:pPr algn="ctr"/>
+            <a:endParaRPr lang="en-US"/>
+          </a:p>
+        </p:txBody>
+      </p:sp>
+      <p:sp>
+        <p:nvSpPr>
+          <p:cNvPr id="9" name="Rectangle 8"/>
+          <p:cNvSpPr/>
+          <p:nvPr/>
+        </p:nvSpPr>
+        <p:spPr>
+          <a:xfrm>
+            <a:off x="964398" y="4284842"/>
+            <a:ext cx="7286320" cy="113496"/>
+          </a:xfrm>
+          <a:prstGeom prst="rect">
+            <a:avLst/>
+          </a:prstGeom>
+          <a:solidFill>
+            <a:schemeClr val="accent1">
+              <a:lumMod val="60000"/>
+              <a:lumOff val="40000"/>
+              <a:alpha val="47000"/>
+            </a:schemeClr>
+          </a:solidFill>
+          <a:ln w="12700">
+            <a:solidFill>
+              <a:schemeClr val="tx2">
+                <a:lumMod val="50000"/>
+              </a:schemeClr>
+            </a:solidFill>
+          </a:ln>
+        </p:spPr>
+        <p:style>
+          <a:lnRef idx="2">
+            <a:schemeClr val="accent1">
+              <a:shade val="50000"/>
+            </a:schemeClr>
+          </a:lnRef>
+          <a:fillRef idx="1">
+            <a:schemeClr val="accent1"/>
+          </a:fillRef>
+          <a:effectRef idx="0">
+            <a:schemeClr val="accent1"/>
+          </a:effectRef>
+          <a:fontRef idx="minor">
+            <a:schemeClr val="lt1"/>
+          </a:fontRef>
+        </p:style>
+        <p:txBody>
+          <a:bodyPr rtlCol="0" anchor="ctr"/>
+          <a:lstStyle/>
+          <a:p>
+            <a:pPr algn="ctr"/>
+            <a:endParaRPr lang="en-US"/>
+          </a:p>
+        </p:txBody>
+      </p:sp>
+      <p:sp>
+        <p:nvSpPr>
+          <p:cNvPr id="10" name="Rectangle 9"/>
+          <p:cNvSpPr/>
+          <p:nvPr/>
+        </p:nvSpPr>
+        <p:spPr>
+          <a:xfrm>
+            <a:off x="964398" y="5043061"/>
+            <a:ext cx="7286320" cy="113496"/>
+          </a:xfrm>
+          <a:prstGeom prst="rect">
+            <a:avLst/>
+          </a:prstGeom>
+          <a:solidFill>
+            <a:schemeClr val="accent1">
+              <a:lumMod val="60000"/>
+              <a:lumOff val="40000"/>
+              <a:alpha val="47000"/>
+            </a:schemeClr>
+          </a:solidFill>
+          <a:ln w="12700">
+            <a:solidFill>
+              <a:schemeClr val="tx2">
+                <a:lumMod val="50000"/>
+              </a:schemeClr>
+            </a:solidFill>
+          </a:ln>
+        </p:spPr>
+        <p:style>
+          <a:lnRef idx="2">
+            <a:schemeClr val="accent1">
+              <a:shade val="50000"/>
+            </a:schemeClr>
+          </a:lnRef>
+          <a:fillRef idx="1">
+            <a:schemeClr val="accent1"/>
+          </a:fillRef>
+          <a:effectRef idx="0">
+            <a:schemeClr val="accent1"/>
+          </a:effectRef>
+          <a:fontRef idx="minor">
+            <a:schemeClr val="lt1"/>
+          </a:fontRef>
+        </p:style>
+        <p:txBody>
+          <a:bodyPr rtlCol="0" anchor="ctr"/>
+          <a:lstStyle/>
+          <a:p>
+            <a:pPr algn="ctr"/>
+            <a:endParaRPr lang="en-US"/>
+          </a:p>
+        </p:txBody>
+      </p:sp>
+      <p:sp>
+        <p:nvSpPr>
+          <p:cNvPr id="11" name="Rectangle 10"/>
+          <p:cNvSpPr/>
+          <p:nvPr/>
+        </p:nvSpPr>
+        <p:spPr>
+          <a:xfrm>
+            <a:off x="964398" y="4663164"/>
+            <a:ext cx="7286320" cy="113496"/>
+          </a:xfrm>
+          <a:prstGeom prst="rect">
+            <a:avLst/>
+          </a:prstGeom>
+          <a:solidFill>
+            <a:schemeClr val="accent1">
+              <a:lumMod val="60000"/>
+              <a:lumOff val="40000"/>
+              <a:alpha val="47000"/>
+            </a:schemeClr>
+          </a:solidFill>
+          <a:ln w="12700">
+            <a:solidFill>
+              <a:schemeClr val="tx2">
+                <a:lumMod val="50000"/>
+              </a:schemeClr>
+            </a:solidFill>
+          </a:ln>
+        </p:spPr>
+        <p:style>
+          <a:lnRef idx="2">
+            <a:schemeClr val="accent1">
+              <a:shade val="50000"/>
+            </a:schemeClr>
+          </a:lnRef>
+          <a:fillRef idx="1">
+            <a:schemeClr val="accent1"/>
+          </a:fillRef>
+          <a:effectRef idx="0">
+            <a:schemeClr val="accent1"/>
+          </a:effectRef>
+          <a:fontRef idx="minor">
+            <a:schemeClr val="lt1"/>
+          </a:fontRef>
+        </p:style>
+        <p:txBody>
+          <a:bodyPr rtlCol="0" anchor="ctr"/>
+          <a:lstStyle/>
+          <a:p>
+            <a:pPr algn="ctr"/>
+            <a:endParaRPr lang="en-US"/>
+          </a:p>
+        </p:txBody>
+      </p:sp>
+      <p:sp>
+        <p:nvSpPr>
+          <p:cNvPr id="12" name="Rectangle 11"/>
+          <p:cNvSpPr/>
+          <p:nvPr/>
+        </p:nvSpPr>
+        <p:spPr>
+          <a:xfrm>
+            <a:off x="964398" y="5304733"/>
+            <a:ext cx="7286320" cy="113496"/>
+          </a:xfrm>
+          <a:prstGeom prst="rect">
+            <a:avLst/>
+          </a:prstGeom>
+          <a:solidFill>
+            <a:schemeClr val="accent1">
+              <a:lumMod val="60000"/>
+              <a:lumOff val="40000"/>
+              <a:alpha val="47000"/>
+            </a:schemeClr>
+          </a:solidFill>
+          <a:ln w="12700">
+            <a:solidFill>
+              <a:schemeClr val="tx2">
+                <a:lumMod val="50000"/>
+              </a:schemeClr>
+            </a:solidFill>
+          </a:ln>
+        </p:spPr>
+        <p:style>
+          <a:lnRef idx="2">
+            <a:schemeClr val="accent1">
+              <a:shade val="50000"/>
+            </a:schemeClr>
+          </a:lnRef>
+          <a:fillRef idx="1">
+            <a:schemeClr val="accent1"/>
+          </a:fillRef>
+          <a:effectRef idx="0">
+            <a:schemeClr val="accent1"/>
+          </a:effectRef>
+          <a:fontRef idx="minor">
+            <a:schemeClr val="lt1"/>
+          </a:fontRef>
+        </p:style>
+        <p:txBody>
+          <a:bodyPr rtlCol="0" anchor="ctr"/>
+          <a:lstStyle/>
+          <a:p>
+            <a:pPr algn="ctr"/>
+            <a:endParaRPr lang="en-US"/>
+          </a:p>
+        </p:txBody>
+      </p:sp>
+      <p:sp>
+        <p:nvSpPr>
+          <p:cNvPr id="13" name="Rectangle 12"/>
+          <p:cNvSpPr/>
+          <p:nvPr/>
+        </p:nvSpPr>
+        <p:spPr>
+          <a:xfrm>
+            <a:off x="964398" y="5683054"/>
+            <a:ext cx="7286320" cy="113496"/>
+          </a:xfrm>
+          <a:prstGeom prst="rect">
+            <a:avLst/>
+          </a:prstGeom>
+          <a:solidFill>
+            <a:schemeClr val="accent1">
+              <a:lumMod val="60000"/>
+              <a:lumOff val="40000"/>
+              <a:alpha val="47000"/>
+            </a:schemeClr>
+          </a:solidFill>
+          <a:ln w="12700">
+            <a:solidFill>
+              <a:schemeClr val="tx2">
+                <a:lumMod val="50000"/>
+              </a:schemeClr>
+            </a:solidFill>
+          </a:ln>
+        </p:spPr>
+        <p:style>
+          <a:lnRef idx="2">
+            <a:schemeClr val="accent1">
+              <a:shade val="50000"/>
+            </a:schemeClr>
+          </a:lnRef>
+          <a:fillRef idx="1">
+            <a:schemeClr val="accent1"/>
+          </a:fillRef>
+          <a:effectRef idx="0">
+            <a:schemeClr val="accent1"/>
+          </a:effectRef>
+          <a:fontRef idx="minor">
+            <a:schemeClr val="lt1"/>
+          </a:fontRef>
+        </p:style>
+        <p:txBody>
+          <a:bodyPr rtlCol="0" anchor="ctr"/>
+          <a:lstStyle/>
+          <a:p>
+            <a:pPr algn="ctr"/>
+            <a:endParaRPr lang="en-US"/>
+          </a:p>
+        </p:txBody>
+      </p:sp>
+      <p:sp>
+        <p:nvSpPr>
+          <p:cNvPr id="14" name="Rectangle 13"/>
+          <p:cNvSpPr/>
+          <p:nvPr/>
+        </p:nvSpPr>
+        <p:spPr>
+          <a:xfrm>
+            <a:off x="964398" y="6062952"/>
+            <a:ext cx="7286320" cy="113496"/>
+          </a:xfrm>
+          <a:prstGeom prst="rect">
+            <a:avLst/>
+          </a:prstGeom>
+          <a:solidFill>
+            <a:schemeClr val="accent1">
+              <a:lumMod val="60000"/>
+              <a:lumOff val="40000"/>
+              <a:alpha val="47000"/>
+            </a:schemeClr>
+          </a:solidFill>
+          <a:ln w="12700">
+            <a:solidFill>
+              <a:schemeClr val="tx2">
+                <a:lumMod val="50000"/>
+              </a:schemeClr>
+            </a:solidFill>
+          </a:ln>
+        </p:spPr>
+        <p:style>
+          <a:lnRef idx="2">
+            <a:schemeClr val="accent1">
+              <a:shade val="50000"/>
+            </a:schemeClr>
+          </a:lnRef>
+          <a:fillRef idx="1">
+            <a:schemeClr val="accent1"/>
+          </a:fillRef>
+          <a:effectRef idx="0">
+            <a:schemeClr val="accent1"/>
+          </a:effectRef>
+          <a:fontRef idx="minor">
+            <a:schemeClr val="lt1"/>
+          </a:fontRef>
+        </p:style>
+        <p:txBody>
+          <a:bodyPr rtlCol="0" anchor="ctr"/>
+          <a:lstStyle/>
+          <a:p>
+            <a:pPr algn="ctr"/>
+            <a:endParaRPr lang="en-US"/>
+          </a:p>
+        </p:txBody>
+      </p:sp>
+      <p:sp>
+        <p:nvSpPr>
+          <p:cNvPr id="18" name="Multiply 17"/>
+          <p:cNvSpPr/>
+          <p:nvPr/>
+        </p:nvSpPr>
+        <p:spPr>
+          <a:xfrm>
+            <a:off x="2667914" y="3863091"/>
+            <a:ext cx="202398" cy="189161"/>
+          </a:xfrm>
+          <a:prstGeom prst="mathMultiply">
+            <a:avLst/>
+          </a:prstGeom>
+          <a:solidFill>
+            <a:srgbClr val="FF0000"/>
+          </a:solidFill>
+          <a:ln>
+            <a:solidFill>
+              <a:srgbClr val="C00000"/>
+            </a:solidFill>
+          </a:ln>
+        </p:spPr>
+        <p:style>
+          <a:lnRef idx="2">
+            <a:schemeClr val="accent1">
+              <a:shade val="50000"/>
+            </a:schemeClr>
+          </a:lnRef>
+          <a:fillRef idx="1">
+            <a:schemeClr val="accent1"/>
+          </a:fillRef>
+          <a:effectRef idx="0">
+            <a:schemeClr val="accent1"/>
+          </a:effectRef>
+          <a:fontRef idx="minor">
+            <a:schemeClr val="lt1"/>
+          </a:fontRef>
+        </p:style>
+        <p:txBody>
+          <a:bodyPr rtlCol="0" anchor="ctr"/>
+          <a:lstStyle/>
+          <a:p>
+            <a:pPr algn="ctr"/>
+            <a:endParaRPr lang="en-US"/>
+          </a:p>
+        </p:txBody>
+      </p:sp>
+      <p:sp>
+        <p:nvSpPr>
+          <p:cNvPr id="102" name="TextBox 101"/>
+          <p:cNvSpPr txBox="1"/>
+          <p:nvPr/>
+        </p:nvSpPr>
+        <p:spPr>
+          <a:xfrm>
+            <a:off x="4175076" y="5544768"/>
+            <a:ext cx="577839" cy="246221"/>
+          </a:xfrm>
+          <a:prstGeom prst="rect">
+            <a:avLst/>
+          </a:prstGeom>
+          <a:solidFill>
+            <a:schemeClr val="bg1">
+              <a:alpha val="54000"/>
+            </a:schemeClr>
+          </a:solidFill>
+        </p:spPr>
+        <p:txBody>
+          <a:bodyPr wrap="square" lIns="0" tIns="0" rIns="0" bIns="0" rtlCol="0">
+            <a:spAutoFit/>
+          </a:bodyPr>
+          <a:lstStyle/>
+          <a:p>
+            <a:pPr algn="ctr"/>
+            <a:r>
+              <a:rPr lang="en-US" sz="1600" dirty="0" smtClean="0"/>
+              <a:t>2’</a:t>
+            </a:r>
+            <a:endParaRPr lang="en-US" sz="1600" dirty="0"/>
+          </a:p>
+        </p:txBody>
+      </p:sp>
+      <p:sp>
+        <p:nvSpPr>
+          <p:cNvPr id="67" name="TextBox 66"/>
+          <p:cNvSpPr txBox="1"/>
+          <p:nvPr/>
+        </p:nvSpPr>
+        <p:spPr>
+          <a:xfrm>
+            <a:off x="2123005" y="3511034"/>
+            <a:ext cx="1292214" cy="369332"/>
+          </a:xfrm>
+          <a:prstGeom prst="rect">
+            <a:avLst/>
+          </a:prstGeom>
+          <a:noFill/>
+        </p:spPr>
+        <p:txBody>
+          <a:bodyPr wrap="square" rtlCol="0">
+            <a:spAutoFit/>
+          </a:bodyPr>
+          <a:lstStyle/>
+          <a:p>
+            <a:pPr algn="ctr"/>
+            <a:r>
+              <a:rPr lang="en-US" dirty="0" smtClean="0"/>
+              <a:t>Span  7</a:t>
+            </a:r>
+            <a:endParaRPr lang="en-US" dirty="0"/>
+          </a:p>
+        </p:txBody>
+      </p:sp>
+      <p:sp>
+        <p:nvSpPr>
+          <p:cNvPr id="68" name="TextBox 67"/>
+          <p:cNvSpPr txBox="1"/>
+          <p:nvPr/>
+        </p:nvSpPr>
+        <p:spPr>
+          <a:xfrm>
+            <a:off x="5895126" y="3511034"/>
+            <a:ext cx="1292214" cy="369332"/>
+          </a:xfrm>
+          <a:prstGeom prst="rect">
+            <a:avLst/>
+          </a:prstGeom>
+          <a:noFill/>
+        </p:spPr>
+        <p:txBody>
+          <a:bodyPr wrap="square" rtlCol="0">
+            <a:spAutoFit/>
+          </a:bodyPr>
+          <a:lstStyle/>
+          <a:p>
+            <a:pPr algn="ctr"/>
+            <a:r>
+              <a:rPr lang="en-US" dirty="0" smtClean="0"/>
+              <a:t>Span  8</a:t>
+            </a:r>
+            <a:endParaRPr lang="en-US" dirty="0"/>
+          </a:p>
+        </p:txBody>
+      </p:sp>
+      <p:cxnSp>
+        <p:nvCxnSpPr>
+          <p:cNvPr id="101" name="Straight Arrow Connector 100"/>
+          <p:cNvCxnSpPr/>
+          <p:nvPr/>
+        </p:nvCxnSpPr>
+        <p:spPr>
+          <a:xfrm>
+            <a:off x="4283425" y="5544768"/>
+            <a:ext cx="320040" cy="0"/>
+          </a:xfrm>
+          <a:prstGeom prst="straightConnector1">
+            <a:avLst/>
+          </a:prstGeom>
+          <a:ln w="22225">
+            <a:solidFill>
+              <a:schemeClr val="tx1"/>
+            </a:solidFill>
+            <a:headEnd type="arrow"/>
+            <a:tailEnd type="arrow"/>
+          </a:ln>
+        </p:spPr>
+        <p:style>
+          <a:lnRef idx="1">
+            <a:schemeClr val="accent1"/>
+          </a:lnRef>
+          <a:fillRef idx="0">
+            <a:schemeClr val="accent1"/>
+          </a:fillRef>
+          <a:effectRef idx="0">
+            <a:schemeClr val="accent1"/>
+          </a:effectRef>
+          <a:fontRef idx="minor">
+            <a:schemeClr val="tx1"/>
+          </a:fontRef>
+        </p:style>
+      </p:cxnSp>
+      <p:cxnSp>
+        <p:nvCxnSpPr>
+          <p:cNvPr id="127" name="Straight Connector 126"/>
+          <p:cNvCxnSpPr/>
+          <p:nvPr/>
+        </p:nvCxnSpPr>
+        <p:spPr>
+          <a:xfrm>
+            <a:off x="1866755" y="3695700"/>
+            <a:ext cx="0" cy="3086100"/>
+          </a:xfrm>
+          <a:prstGeom prst="line">
+            <a:avLst/>
+          </a:prstGeom>
+          <a:ln w="19050">
+            <a:solidFill>
+              <a:schemeClr val="tx1"/>
+            </a:solidFill>
+            <a:prstDash val="sysDash"/>
+          </a:ln>
+        </p:spPr>
+        <p:style>
+          <a:lnRef idx="1">
+            <a:schemeClr val="accent1"/>
+          </a:lnRef>
+          <a:fillRef idx="0">
+            <a:schemeClr val="accent1"/>
+          </a:fillRef>
+          <a:effectRef idx="0">
+            <a:schemeClr val="accent1"/>
+          </a:effectRef>
+          <a:fontRef idx="minor">
+            <a:schemeClr val="tx1"/>
+          </a:fontRef>
+        </p:style>
+      </p:cxnSp>
+      <p:sp>
+        <p:nvSpPr>
+          <p:cNvPr id="128" name="TextBox 127"/>
+          <p:cNvSpPr txBox="1"/>
+          <p:nvPr/>
+        </p:nvSpPr>
+        <p:spPr>
+          <a:xfrm>
+            <a:off x="1815554" y="6629400"/>
+            <a:ext cx="488624" cy="276999"/>
+          </a:xfrm>
+          <a:prstGeom prst="rect">
+            <a:avLst/>
+          </a:prstGeom>
+          <a:noFill/>
+        </p:spPr>
+        <p:txBody>
+          <a:bodyPr wrap="square" rtlCol="0">
+            <a:spAutoFit/>
+          </a:bodyPr>
+          <a:lstStyle/>
+          <a:p>
+            <a:r>
+              <a:rPr lang="en-US" sz="1200" dirty="0" smtClean="0"/>
+              <a:t>1/4</a:t>
+            </a:r>
+            <a:endParaRPr lang="en-US" sz="1200" dirty="0"/>
+          </a:p>
+        </p:txBody>
+      </p:sp>
+      <p:cxnSp>
+        <p:nvCxnSpPr>
+          <p:cNvPr id="129" name="Straight Connector 128"/>
+          <p:cNvCxnSpPr/>
+          <p:nvPr/>
+        </p:nvCxnSpPr>
+        <p:spPr>
+          <a:xfrm>
+            <a:off x="2775291" y="3694317"/>
+            <a:ext cx="0" cy="3086100"/>
+          </a:xfrm>
+          <a:prstGeom prst="line">
+            <a:avLst/>
+          </a:prstGeom>
+          <a:ln w="19050">
+            <a:solidFill>
+              <a:schemeClr val="tx1"/>
+            </a:solidFill>
+            <a:prstDash val="sysDash"/>
+          </a:ln>
+        </p:spPr>
+        <p:style>
+          <a:lnRef idx="1">
+            <a:schemeClr val="accent1"/>
+          </a:lnRef>
+          <a:fillRef idx="0">
+            <a:schemeClr val="accent1"/>
+          </a:fillRef>
+          <a:effectRef idx="0">
+            <a:schemeClr val="accent1"/>
+          </a:effectRef>
+          <a:fontRef idx="minor">
+            <a:schemeClr val="tx1"/>
+          </a:fontRef>
+        </p:style>
+      </p:cxnSp>
+      <p:sp>
+        <p:nvSpPr>
+          <p:cNvPr id="130" name="TextBox 129"/>
+          <p:cNvSpPr txBox="1"/>
+          <p:nvPr/>
+        </p:nvSpPr>
+        <p:spPr>
+          <a:xfrm>
+            <a:off x="2724089" y="6628017"/>
+            <a:ext cx="861955" cy="276999"/>
+          </a:xfrm>
+          <a:prstGeom prst="rect">
+            <a:avLst/>
+          </a:prstGeom>
+          <a:noFill/>
+        </p:spPr>
+        <p:txBody>
+          <a:bodyPr wrap="square" rtlCol="0">
+            <a:spAutoFit/>
+          </a:bodyPr>
+          <a:lstStyle/>
+          <a:p>
+            <a:r>
+              <a:rPr lang="en-US" sz="1200" dirty="0" err="1" smtClean="0"/>
+              <a:t>Midspan</a:t>
+            </a:r>
+            <a:endParaRPr lang="en-US" sz="1200" dirty="0"/>
+          </a:p>
+        </p:txBody>
+      </p:sp>
+      <p:cxnSp>
+        <p:nvCxnSpPr>
+          <p:cNvPr id="131" name="Straight Connector 130"/>
+          <p:cNvCxnSpPr/>
+          <p:nvPr/>
+        </p:nvCxnSpPr>
+        <p:spPr>
+          <a:xfrm>
+            <a:off x="3707523" y="3694317"/>
+            <a:ext cx="0" cy="3086100"/>
+          </a:xfrm>
+          <a:prstGeom prst="line">
+            <a:avLst/>
+          </a:prstGeom>
+          <a:ln w="19050">
+            <a:solidFill>
+              <a:schemeClr val="tx1"/>
+            </a:solidFill>
+            <a:prstDash val="sysDash"/>
+          </a:ln>
+        </p:spPr>
+        <p:style>
+          <a:lnRef idx="1">
+            <a:schemeClr val="accent1"/>
+          </a:lnRef>
+          <a:fillRef idx="0">
+            <a:schemeClr val="accent1"/>
+          </a:fillRef>
+          <a:effectRef idx="0">
+            <a:schemeClr val="accent1"/>
+          </a:effectRef>
+          <a:fontRef idx="minor">
+            <a:schemeClr val="tx1"/>
+          </a:fontRef>
+        </p:style>
+      </p:cxnSp>
+      <p:sp>
+        <p:nvSpPr>
+          <p:cNvPr id="132" name="TextBox 131"/>
+          <p:cNvSpPr txBox="1"/>
+          <p:nvPr/>
+        </p:nvSpPr>
+        <p:spPr>
+          <a:xfrm>
+            <a:off x="3656322" y="6628017"/>
+            <a:ext cx="488624" cy="276999"/>
+          </a:xfrm>
+          <a:prstGeom prst="rect">
+            <a:avLst/>
+          </a:prstGeom>
+          <a:noFill/>
+        </p:spPr>
+        <p:txBody>
+          <a:bodyPr wrap="square" rtlCol="0">
+            <a:spAutoFit/>
+          </a:bodyPr>
+          <a:lstStyle/>
+          <a:p>
+            <a:r>
+              <a:rPr lang="en-US" sz="1200" dirty="0" smtClean="0"/>
+              <a:t>3/4</a:t>
+            </a:r>
+            <a:endParaRPr lang="en-US" sz="1200" dirty="0"/>
+          </a:p>
+        </p:txBody>
+      </p:sp>
+      <p:sp>
+        <p:nvSpPr>
+          <p:cNvPr id="134" name="TextBox 133"/>
+          <p:cNvSpPr txBox="1"/>
+          <p:nvPr/>
+        </p:nvSpPr>
+        <p:spPr>
+          <a:xfrm>
+            <a:off x="5510442" y="6628017"/>
+            <a:ext cx="488624" cy="276999"/>
+          </a:xfrm>
+          <a:prstGeom prst="rect">
+            <a:avLst/>
+          </a:prstGeom>
+          <a:noFill/>
+        </p:spPr>
+        <p:txBody>
+          <a:bodyPr wrap="square" rtlCol="0">
+            <a:spAutoFit/>
+          </a:bodyPr>
+          <a:lstStyle/>
+          <a:p>
+            <a:r>
+              <a:rPr lang="en-US" sz="1200" dirty="0" smtClean="0"/>
+              <a:t>1/4</a:t>
+            </a:r>
+            <a:endParaRPr lang="en-US" sz="1200" dirty="0"/>
+          </a:p>
+        </p:txBody>
+      </p:sp>
+      <p:cxnSp>
+        <p:nvCxnSpPr>
+          <p:cNvPr id="138" name="Straight Connector 137"/>
+          <p:cNvCxnSpPr>
+            <a:stCxn id="12" idx="2"/>
+            <a:endCxn id="13" idx="0"/>
+          </p:cNvCxnSpPr>
+          <p:nvPr/>
+        </p:nvCxnSpPr>
+        <p:spPr>
+          <a:xfrm>
+            <a:off x="4607558" y="5418229"/>
+            <a:ext cx="0" cy="264825"/>
+          </a:xfrm>
+          <a:prstGeom prst="line">
+            <a:avLst/>
+          </a:prstGeom>
+        </p:spPr>
+        <p:style>
+          <a:lnRef idx="1">
+            <a:schemeClr val="accent1"/>
+          </a:lnRef>
+          <a:fillRef idx="0">
+            <a:schemeClr val="accent1"/>
+          </a:fillRef>
+          <a:effectRef idx="0">
+            <a:schemeClr val="accent1"/>
+          </a:effectRef>
+          <a:fontRef idx="minor">
+            <a:schemeClr val="tx1"/>
+          </a:fontRef>
+        </p:style>
+      </p:cxnSp>
+      <p:cxnSp>
+        <p:nvCxnSpPr>
+          <p:cNvPr id="139" name="Straight Connector 138"/>
+          <p:cNvCxnSpPr/>
+          <p:nvPr/>
+        </p:nvCxnSpPr>
+        <p:spPr>
+          <a:xfrm flipH="1">
+            <a:off x="4286250" y="5181600"/>
+            <a:ext cx="0" cy="493425"/>
+          </a:xfrm>
+          <a:prstGeom prst="line">
+            <a:avLst/>
+          </a:prstGeom>
+        </p:spPr>
+        <p:style>
+          <a:lnRef idx="1">
+            <a:schemeClr val="accent1"/>
+          </a:lnRef>
+          <a:fillRef idx="0">
+            <a:schemeClr val="accent1"/>
+          </a:fillRef>
+          <a:effectRef idx="0">
+            <a:schemeClr val="accent1"/>
+          </a:effectRef>
+          <a:fontRef idx="minor">
+            <a:schemeClr val="tx1"/>
+          </a:fontRef>
+        </p:style>
+      </p:cxnSp>
+      <p:grpSp>
+        <p:nvGrpSpPr>
+          <p:cNvPr id="152" name="Group 151"/>
+          <p:cNvGrpSpPr/>
+          <p:nvPr/>
+        </p:nvGrpSpPr>
+        <p:grpSpPr>
+          <a:xfrm>
+            <a:off x="838200" y="2590800"/>
+            <a:ext cx="1470019" cy="1264413"/>
+            <a:chOff x="-2133600" y="3954110"/>
+            <a:chExt cx="1470019" cy="1264413"/>
+          </a:xfrm>
+        </p:grpSpPr>
+        <p:grpSp>
+          <p:nvGrpSpPr>
+            <p:cNvPr id="150" name="Group 149"/>
+            <p:cNvGrpSpPr/>
+            <p:nvPr/>
+          </p:nvGrpSpPr>
+          <p:grpSpPr>
+            <a:xfrm>
+              <a:off x="-2057400" y="3954110"/>
+              <a:ext cx="1393819" cy="1264413"/>
+              <a:chOff x="-2057400" y="3954110"/>
+              <a:chExt cx="1393819" cy="1264413"/>
+            </a:xfrm>
+          </p:grpSpPr>
+          <p:grpSp>
+            <p:nvGrpSpPr>
+              <p:cNvPr id="104" name="Group 103"/>
+              <p:cNvGrpSpPr/>
+              <p:nvPr/>
+            </p:nvGrpSpPr>
+            <p:grpSpPr>
+              <a:xfrm>
+                <a:off x="-2049722" y="3954110"/>
+                <a:ext cx="737107" cy="905059"/>
+                <a:chOff x="6400800" y="907088"/>
+                <a:chExt cx="1524000" cy="2217112"/>
+              </a:xfrm>
+            </p:grpSpPr>
+            <p:sp>
+              <p:nvSpPr>
+                <p:cNvPr id="105" name="Rectangle 104"/>
+                <p:cNvSpPr/>
+                <p:nvPr/>
+              </p:nvSpPr>
+              <p:spPr>
+                <a:xfrm>
+                  <a:off x="6400800" y="907088"/>
+                  <a:ext cx="1524000" cy="152400"/>
+                </a:xfrm>
+                <a:prstGeom prst="rect">
+                  <a:avLst/>
+                </a:prstGeom>
+                <a:solidFill>
+                  <a:schemeClr val="accent1">
+                    <a:lumMod val="20000"/>
+                    <a:lumOff val="80000"/>
+                  </a:schemeClr>
+                </a:solidFill>
+              </p:spPr>
+              <p:style>
+                <a:lnRef idx="2">
+                  <a:schemeClr val="accent1">
+                    <a:shade val="50000"/>
+                  </a:schemeClr>
+                </a:lnRef>
+                <a:fillRef idx="1">
+                  <a:schemeClr val="accent1"/>
+                </a:fillRef>
+                <a:effectRef idx="0">
+                  <a:schemeClr val="accent1"/>
+                </a:effectRef>
+                <a:fontRef idx="minor">
+                  <a:schemeClr val="lt1"/>
+                </a:fontRef>
+              </p:style>
+              <p:txBody>
+                <a:bodyPr rtlCol="0" anchor="ctr"/>
+                <a:lstStyle/>
+                <a:p>
+                  <a:pPr algn="ctr"/>
+                  <a:endParaRPr lang="en-US" sz="1000"/>
+                </a:p>
+              </p:txBody>
+            </p:sp>
+            <p:sp>
+              <p:nvSpPr>
+                <p:cNvPr id="106" name="Rectangle 105"/>
+                <p:cNvSpPr/>
+                <p:nvPr/>
+              </p:nvSpPr>
+              <p:spPr>
+                <a:xfrm>
+                  <a:off x="6400800" y="2812088"/>
+                  <a:ext cx="1524000" cy="152400"/>
+                </a:xfrm>
+                <a:prstGeom prst="rect">
+                  <a:avLst/>
+                </a:prstGeom>
+                <a:solidFill>
+                  <a:schemeClr val="accent1">
+                    <a:lumMod val="20000"/>
+                    <a:lumOff val="80000"/>
+                  </a:schemeClr>
+                </a:solidFill>
+              </p:spPr>
+              <p:style>
+                <a:lnRef idx="2">
+                  <a:schemeClr val="accent1">
+                    <a:shade val="50000"/>
+                  </a:schemeClr>
+                </a:lnRef>
+                <a:fillRef idx="1">
+                  <a:schemeClr val="accent1"/>
+                </a:fillRef>
+                <a:effectRef idx="0">
+                  <a:schemeClr val="accent1"/>
+                </a:effectRef>
+                <a:fontRef idx="minor">
+                  <a:schemeClr val="lt1"/>
+                </a:fontRef>
+              </p:style>
+              <p:txBody>
+                <a:bodyPr rtlCol="0" anchor="ctr"/>
+                <a:lstStyle/>
+                <a:p>
+                  <a:pPr algn="ctr"/>
+                  <a:endParaRPr lang="en-US" sz="1000"/>
+                </a:p>
+              </p:txBody>
+            </p:sp>
+            <p:sp>
+              <p:nvSpPr>
+                <p:cNvPr id="107" name="Rectangle 106"/>
+                <p:cNvSpPr/>
+                <p:nvPr/>
+              </p:nvSpPr>
+              <p:spPr>
+                <a:xfrm>
+                  <a:off x="7086600" y="1059488"/>
+                  <a:ext cx="152400" cy="1752600"/>
+                </a:xfrm>
+                <a:prstGeom prst="rect">
+                  <a:avLst/>
+                </a:prstGeom>
+                <a:solidFill>
+                  <a:schemeClr val="accent1">
+                    <a:lumMod val="20000"/>
+                    <a:lumOff val="80000"/>
+                  </a:schemeClr>
+                </a:solidFill>
+              </p:spPr>
+              <p:style>
+                <a:lnRef idx="2">
+                  <a:schemeClr val="accent1">
+                    <a:shade val="50000"/>
+                  </a:schemeClr>
+                </a:lnRef>
+                <a:fillRef idx="1">
+                  <a:schemeClr val="accent1"/>
+                </a:fillRef>
+                <a:effectRef idx="0">
+                  <a:schemeClr val="accent1"/>
+                </a:effectRef>
+                <a:fontRef idx="minor">
+                  <a:schemeClr val="lt1"/>
+                </a:fontRef>
+              </p:style>
+              <p:txBody>
+                <a:bodyPr rtlCol="0" anchor="ctr"/>
+                <a:lstStyle/>
+                <a:p>
+                  <a:pPr algn="ctr"/>
+                  <a:endParaRPr lang="en-US" sz="1000"/>
+                </a:p>
+              </p:txBody>
+            </p:sp>
+            <p:sp>
+              <p:nvSpPr>
+                <p:cNvPr id="108" name="Rectangle 107"/>
+                <p:cNvSpPr/>
+                <p:nvPr/>
+              </p:nvSpPr>
+              <p:spPr>
+                <a:xfrm>
+                  <a:off x="6761729" y="2974032"/>
+                  <a:ext cx="152401" cy="150168"/>
+                </a:xfrm>
+                <a:prstGeom prst="rect">
+                  <a:avLst/>
+                </a:prstGeom>
+                <a:solidFill>
+                  <a:schemeClr val="accent2"/>
+                </a:solidFill>
+                <a:ln>
+                  <a:solidFill>
+                    <a:schemeClr val="accent2">
+                      <a:lumMod val="50000"/>
+                    </a:schemeClr>
+                  </a:solidFill>
+                </a:ln>
+              </p:spPr>
+              <p:style>
+                <a:lnRef idx="2">
+                  <a:schemeClr val="accent1">
+                    <a:shade val="50000"/>
+                  </a:schemeClr>
+                </a:lnRef>
+                <a:fillRef idx="1">
+                  <a:schemeClr val="accent1"/>
+                </a:fillRef>
+                <a:effectRef idx="0">
+                  <a:schemeClr val="accent1"/>
+                </a:effectRef>
+                <a:fontRef idx="minor">
+                  <a:schemeClr val="lt1"/>
+                </a:fontRef>
+              </p:style>
+              <p:txBody>
+                <a:bodyPr rtlCol="0" anchor="ctr"/>
+                <a:lstStyle/>
+                <a:p>
+                  <a:pPr algn="ctr"/>
+                  <a:endParaRPr lang="en-US" sz="1000"/>
+                </a:p>
+              </p:txBody>
+            </p:sp>
+            <p:sp>
+              <p:nvSpPr>
+                <p:cNvPr id="109" name="Rectangle 108"/>
+                <p:cNvSpPr/>
+                <p:nvPr/>
+              </p:nvSpPr>
+              <p:spPr>
+                <a:xfrm>
+                  <a:off x="7239000" y="2133520"/>
+                  <a:ext cx="152400" cy="150168"/>
+                </a:xfrm>
+                <a:prstGeom prst="rect">
+                  <a:avLst/>
+                </a:prstGeom>
+                <a:solidFill>
+                  <a:schemeClr val="accent2"/>
+                </a:solidFill>
+                <a:ln>
+                  <a:solidFill>
+                    <a:schemeClr val="accent2">
+                      <a:lumMod val="50000"/>
+                    </a:schemeClr>
+                  </a:solidFill>
+                </a:ln>
+              </p:spPr>
+              <p:style>
+                <a:lnRef idx="2">
+                  <a:schemeClr val="accent1">
+                    <a:shade val="50000"/>
+                  </a:schemeClr>
+                </a:lnRef>
+                <a:fillRef idx="1">
+                  <a:schemeClr val="accent1"/>
+                </a:fillRef>
+                <a:effectRef idx="0">
+                  <a:schemeClr val="accent1"/>
+                </a:effectRef>
+                <a:fontRef idx="minor">
+                  <a:schemeClr val="lt1"/>
+                </a:fontRef>
+              </p:style>
+              <p:txBody>
+                <a:bodyPr rtlCol="0" anchor="ctr"/>
+                <a:lstStyle/>
+                <a:p>
+                  <a:pPr algn="ctr"/>
+                  <a:endParaRPr lang="en-US" sz="1000"/>
+                </a:p>
+              </p:txBody>
+            </p:sp>
+            <p:sp>
+              <p:nvSpPr>
+                <p:cNvPr id="110" name="Rectangle 109"/>
+                <p:cNvSpPr/>
+                <p:nvPr/>
+              </p:nvSpPr>
+              <p:spPr>
+                <a:xfrm>
+                  <a:off x="7239000" y="1499757"/>
+                  <a:ext cx="152400" cy="150168"/>
+                </a:xfrm>
+                <a:prstGeom prst="rect">
+                  <a:avLst/>
+                </a:prstGeom>
+                <a:solidFill>
+                  <a:schemeClr val="accent2"/>
+                </a:solidFill>
+                <a:ln>
+                  <a:solidFill>
+                    <a:schemeClr val="accent2">
+                      <a:lumMod val="50000"/>
+                    </a:schemeClr>
+                  </a:solidFill>
+                </a:ln>
+              </p:spPr>
+              <p:style>
+                <a:lnRef idx="2">
+                  <a:schemeClr val="accent1">
+                    <a:shade val="50000"/>
+                  </a:schemeClr>
+                </a:lnRef>
+                <a:fillRef idx="1">
+                  <a:schemeClr val="accent1"/>
+                </a:fillRef>
+                <a:effectRef idx="0">
+                  <a:schemeClr val="accent1"/>
+                </a:effectRef>
+                <a:fontRef idx="minor">
+                  <a:schemeClr val="lt1"/>
+                </a:fontRef>
+              </p:style>
+              <p:txBody>
+                <a:bodyPr rtlCol="0" anchor="ctr"/>
+                <a:lstStyle/>
+                <a:p>
+                  <a:pPr algn="ctr"/>
+                  <a:endParaRPr lang="en-US" sz="1000"/>
+                </a:p>
+              </p:txBody>
+            </p:sp>
+            <p:sp>
+              <p:nvSpPr>
+                <p:cNvPr id="111" name="Rectangle 110"/>
+                <p:cNvSpPr/>
+                <p:nvPr/>
+              </p:nvSpPr>
+              <p:spPr>
+                <a:xfrm>
+                  <a:off x="7431584" y="2971800"/>
+                  <a:ext cx="152401" cy="150168"/>
+                </a:xfrm>
+                <a:prstGeom prst="rect">
+                  <a:avLst/>
+                </a:prstGeom>
+                <a:solidFill>
+                  <a:schemeClr val="accent2"/>
+                </a:solidFill>
+                <a:ln>
+                  <a:solidFill>
+                    <a:schemeClr val="accent2">
+                      <a:lumMod val="50000"/>
+                    </a:schemeClr>
+                  </a:solidFill>
+                </a:ln>
+              </p:spPr>
+              <p:style>
+                <a:lnRef idx="2">
+                  <a:schemeClr val="accent1">
+                    <a:shade val="50000"/>
+                  </a:schemeClr>
+                </a:lnRef>
+                <a:fillRef idx="1">
+                  <a:schemeClr val="accent1"/>
+                </a:fillRef>
+                <a:effectRef idx="0">
+                  <a:schemeClr val="accent1"/>
+                </a:effectRef>
+                <a:fontRef idx="minor">
+                  <a:schemeClr val="lt1"/>
+                </a:fontRef>
+              </p:style>
+              <p:txBody>
+                <a:bodyPr rtlCol="0" anchor="ctr"/>
+                <a:lstStyle/>
+                <a:p>
+                  <a:pPr algn="ctr"/>
+                  <a:endParaRPr lang="en-US" sz="1000"/>
+                </a:p>
+              </p:txBody>
+            </p:sp>
+          </p:grpSp>
+          <p:cxnSp>
+            <p:nvCxnSpPr>
+              <p:cNvPr id="113" name="Straight Arrow Connector 112"/>
+              <p:cNvCxnSpPr/>
+              <p:nvPr/>
+            </p:nvCxnSpPr>
+            <p:spPr>
+              <a:xfrm flipV="1">
+                <a:off x="-1205120" y="3954111"/>
+                <a:ext cx="0" cy="301686"/>
+              </a:xfrm>
+              <a:prstGeom prst="straightConnector1">
+                <a:avLst/>
+              </a:prstGeom>
+              <a:ln w="22225">
+                <a:solidFill>
+                  <a:schemeClr val="tx1"/>
+                </a:solidFill>
+                <a:headEnd type="arrow"/>
+                <a:tailEnd type="arrow"/>
+              </a:ln>
+            </p:spPr>
+            <p:style>
+              <a:lnRef idx="1">
+                <a:schemeClr val="accent1"/>
+              </a:lnRef>
+              <a:fillRef idx="0">
+                <a:schemeClr val="accent1"/>
+              </a:fillRef>
+              <a:effectRef idx="0">
+                <a:schemeClr val="accent1"/>
+              </a:effectRef>
+              <a:fontRef idx="minor">
+                <a:schemeClr val="tx1"/>
+              </a:fontRef>
+            </p:style>
+          </p:cxnSp>
+          <p:sp>
+            <p:nvSpPr>
+              <p:cNvPr id="114" name="TextBox 113"/>
+              <p:cNvSpPr txBox="1"/>
+              <p:nvPr/>
+            </p:nvSpPr>
+            <p:spPr>
+              <a:xfrm>
+                <a:off x="-1444831" y="4024144"/>
+                <a:ext cx="781250" cy="246221"/>
+              </a:xfrm>
+              <a:prstGeom prst="rect">
+                <a:avLst/>
+              </a:prstGeom>
+              <a:noFill/>
+            </p:spPr>
+            <p:txBody>
+              <a:bodyPr wrap="square" rtlCol="0">
+                <a:spAutoFit/>
+              </a:bodyPr>
+              <a:lstStyle/>
+              <a:p>
+                <a:pPr algn="ctr"/>
+                <a:r>
+                  <a:rPr lang="en-US" sz="1000" dirty="0" smtClean="0"/>
+                  <a:t>h/3</a:t>
+                </a:r>
+                <a:endParaRPr lang="en-US" sz="1000" dirty="0"/>
+              </a:p>
+            </p:txBody>
+          </p:sp>
+          <p:cxnSp>
+            <p:nvCxnSpPr>
+              <p:cNvPr id="115" name="Straight Arrow Connector 114"/>
+              <p:cNvCxnSpPr/>
+              <p:nvPr/>
+            </p:nvCxnSpPr>
+            <p:spPr>
+              <a:xfrm flipV="1">
+                <a:off x="-1205120" y="4218086"/>
+                <a:ext cx="0" cy="301686"/>
+              </a:xfrm>
+              <a:prstGeom prst="straightConnector1">
+                <a:avLst/>
+              </a:prstGeom>
+              <a:ln w="22225">
+                <a:solidFill>
+                  <a:schemeClr val="tx1"/>
+                </a:solidFill>
+                <a:headEnd type="arrow"/>
+                <a:tailEnd type="arrow"/>
+              </a:ln>
+            </p:spPr>
+            <p:style>
+              <a:lnRef idx="1">
+                <a:schemeClr val="accent1"/>
+              </a:lnRef>
+              <a:fillRef idx="0">
+                <a:schemeClr val="accent1"/>
+              </a:fillRef>
+              <a:effectRef idx="0">
+                <a:schemeClr val="accent1"/>
+              </a:effectRef>
+              <a:fontRef idx="minor">
+                <a:schemeClr val="tx1"/>
+              </a:fontRef>
+            </p:style>
+          </p:cxnSp>
+          <p:sp>
+            <p:nvSpPr>
+              <p:cNvPr id="116" name="TextBox 115"/>
+              <p:cNvSpPr txBox="1"/>
+              <p:nvPr/>
+            </p:nvSpPr>
+            <p:spPr>
+              <a:xfrm>
+                <a:off x="-1444831" y="4288120"/>
+                <a:ext cx="781250" cy="246221"/>
+              </a:xfrm>
+              <a:prstGeom prst="rect">
+                <a:avLst/>
+              </a:prstGeom>
+              <a:noFill/>
+            </p:spPr>
+            <p:txBody>
+              <a:bodyPr wrap="square" rtlCol="0">
+                <a:spAutoFit/>
+              </a:bodyPr>
+              <a:lstStyle/>
+              <a:p>
+                <a:pPr algn="ctr"/>
+                <a:r>
+                  <a:rPr lang="en-US" sz="1000" dirty="0" smtClean="0"/>
+                  <a:t>h/3</a:t>
+                </a:r>
+                <a:endParaRPr lang="en-US" sz="1000" dirty="0"/>
+              </a:p>
+            </p:txBody>
+          </p:sp>
+          <p:cxnSp>
+            <p:nvCxnSpPr>
+              <p:cNvPr id="117" name="Straight Arrow Connector 116"/>
+              <p:cNvCxnSpPr/>
+              <p:nvPr/>
+            </p:nvCxnSpPr>
+            <p:spPr>
+              <a:xfrm flipV="1">
+                <a:off x="-1205120" y="4503611"/>
+                <a:ext cx="0" cy="301686"/>
+              </a:xfrm>
+              <a:prstGeom prst="straightConnector1">
+                <a:avLst/>
+              </a:prstGeom>
+              <a:ln w="22225">
+                <a:solidFill>
+                  <a:schemeClr val="tx1"/>
+                </a:solidFill>
+                <a:headEnd type="arrow"/>
+                <a:tailEnd type="arrow"/>
+              </a:ln>
+            </p:spPr>
+            <p:style>
+              <a:lnRef idx="1">
+                <a:schemeClr val="accent1"/>
+              </a:lnRef>
+              <a:fillRef idx="0">
+                <a:schemeClr val="accent1"/>
+              </a:fillRef>
+              <a:effectRef idx="0">
+                <a:schemeClr val="accent1"/>
+              </a:effectRef>
+              <a:fontRef idx="minor">
+                <a:schemeClr val="tx1"/>
+              </a:fontRef>
+            </p:style>
+          </p:cxnSp>
+          <p:sp>
+            <p:nvSpPr>
+              <p:cNvPr id="118" name="TextBox 117"/>
+              <p:cNvSpPr txBox="1"/>
+              <p:nvPr/>
+            </p:nvSpPr>
+            <p:spPr>
+              <a:xfrm>
+                <a:off x="-1444831" y="4573645"/>
+                <a:ext cx="781250" cy="246221"/>
+              </a:xfrm>
+              <a:prstGeom prst="rect">
+                <a:avLst/>
+              </a:prstGeom>
+              <a:noFill/>
+            </p:spPr>
+            <p:txBody>
+              <a:bodyPr wrap="square" rtlCol="0">
+                <a:spAutoFit/>
+              </a:bodyPr>
+              <a:lstStyle/>
+              <a:p>
+                <a:pPr algn="ctr"/>
+                <a:r>
+                  <a:rPr lang="en-US" sz="1000" dirty="0" smtClean="0"/>
+                  <a:t>h/3</a:t>
+                </a:r>
+                <a:endParaRPr lang="en-US" sz="1000" dirty="0"/>
+              </a:p>
+            </p:txBody>
+          </p:sp>
+          <p:cxnSp>
+            <p:nvCxnSpPr>
+              <p:cNvPr id="119" name="Straight Arrow Connector 118"/>
+              <p:cNvCxnSpPr/>
+              <p:nvPr/>
+            </p:nvCxnSpPr>
+            <p:spPr>
+              <a:xfrm flipH="1">
+                <a:off x="-2057400" y="4961527"/>
+                <a:ext cx="274320" cy="0"/>
+              </a:xfrm>
+              <a:prstGeom prst="straightConnector1">
+                <a:avLst/>
+              </a:prstGeom>
+              <a:ln w="22225">
+                <a:solidFill>
+                  <a:schemeClr val="tx1"/>
+                </a:solidFill>
+                <a:headEnd type="arrow"/>
+                <a:tailEnd type="arrow"/>
+              </a:ln>
+            </p:spPr>
+            <p:style>
+              <a:lnRef idx="1">
+                <a:schemeClr val="accent1"/>
+              </a:lnRef>
+              <a:fillRef idx="0">
+                <a:schemeClr val="accent1"/>
+              </a:fillRef>
+              <a:effectRef idx="0">
+                <a:schemeClr val="accent1"/>
+              </a:effectRef>
+              <a:fontRef idx="minor">
+                <a:schemeClr val="tx1"/>
+              </a:fontRef>
+            </p:style>
+          </p:cxnSp>
+          <p:cxnSp>
+            <p:nvCxnSpPr>
+              <p:cNvPr id="120" name="Straight Arrow Connector 119"/>
+              <p:cNvCxnSpPr/>
+              <p:nvPr/>
+            </p:nvCxnSpPr>
+            <p:spPr>
+              <a:xfrm flipH="1">
+                <a:off x="-1570602" y="4956140"/>
+                <a:ext cx="274320" cy="5387"/>
+              </a:xfrm>
+              <a:prstGeom prst="straightConnector1">
+                <a:avLst/>
+              </a:prstGeom>
+              <a:ln w="22225">
+                <a:solidFill>
+                  <a:schemeClr val="tx1"/>
+                </a:solidFill>
+                <a:headEnd type="arrow"/>
+                <a:tailEnd type="arrow"/>
+              </a:ln>
+            </p:spPr>
+            <p:style>
+              <a:lnRef idx="1">
+                <a:schemeClr val="accent1"/>
+              </a:lnRef>
+              <a:fillRef idx="0">
+                <a:schemeClr val="accent1"/>
+              </a:fillRef>
+              <a:effectRef idx="0">
+                <a:schemeClr val="accent1"/>
+              </a:effectRef>
+              <a:fontRef idx="minor">
+                <a:schemeClr val="tx1"/>
+              </a:fontRef>
+            </p:style>
+          </p:cxnSp>
+          <p:sp>
+            <p:nvSpPr>
+              <p:cNvPr id="121" name="TextBox 120"/>
+              <p:cNvSpPr txBox="1"/>
+              <p:nvPr/>
+            </p:nvSpPr>
+            <p:spPr>
+              <a:xfrm>
+                <a:off x="-1775227" y="4972302"/>
+                <a:ext cx="781250" cy="246221"/>
+              </a:xfrm>
+              <a:prstGeom prst="rect">
+                <a:avLst/>
+              </a:prstGeom>
+              <a:noFill/>
+            </p:spPr>
+            <p:txBody>
+              <a:bodyPr wrap="square" rtlCol="0">
+                <a:spAutoFit/>
+              </a:bodyPr>
+              <a:lstStyle/>
+              <a:p>
+                <a:pPr algn="ctr"/>
+                <a:r>
+                  <a:rPr lang="en-US" sz="1000" dirty="0" smtClean="0"/>
+                  <a:t>6”</a:t>
+                </a:r>
+                <a:endParaRPr lang="en-US" sz="1000" dirty="0"/>
+              </a:p>
+            </p:txBody>
+          </p:sp>
+        </p:grpSp>
+        <p:sp>
+          <p:nvSpPr>
+            <p:cNvPr id="151" name="Oval 150"/>
+            <p:cNvSpPr/>
+            <p:nvPr/>
+          </p:nvSpPr>
+          <p:spPr>
+            <a:xfrm>
+              <a:off x="-2133600" y="4270383"/>
+              <a:ext cx="228600" cy="225417"/>
+            </a:xfrm>
+            <a:prstGeom prst="ellipse">
+              <a:avLst/>
+            </a:prstGeom>
+            <a:noFill/>
+            <a:ln>
+              <a:solidFill>
+                <a:srgbClr val="FF0000"/>
+              </a:solidFill>
+            </a:ln>
+          </p:spPr>
+          <p:style>
+            <a:lnRef idx="2">
+              <a:schemeClr val="accent1">
+                <a:shade val="50000"/>
+              </a:schemeClr>
+            </a:lnRef>
+            <a:fillRef idx="1">
+              <a:schemeClr val="accent1"/>
+            </a:fillRef>
+            <a:effectRef idx="0">
+              <a:schemeClr val="accent1"/>
+            </a:effectRef>
+            <a:fontRef idx="minor">
+              <a:schemeClr val="lt1"/>
+            </a:fontRef>
+          </p:style>
+          <p:txBody>
+            <a:bodyPr rtlCol="0" anchor="ctr"/>
+            <a:lstStyle/>
+            <a:p>
+              <a:pPr algn="ctr"/>
+              <a:endParaRPr lang="en-US"/>
+            </a:p>
+          </p:txBody>
+        </p:sp>
+      </p:grpSp>
+      <p:grpSp>
+        <p:nvGrpSpPr>
+          <p:cNvPr id="163" name="Group 162"/>
+          <p:cNvGrpSpPr/>
+          <p:nvPr/>
+        </p:nvGrpSpPr>
+        <p:grpSpPr>
+          <a:xfrm>
+            <a:off x="4302476" y="76200"/>
+            <a:ext cx="4725243" cy="3276600"/>
+            <a:chOff x="4302476" y="76200"/>
+            <a:chExt cx="4725243" cy="3276600"/>
+          </a:xfrm>
+        </p:grpSpPr>
+        <p:sp>
+          <p:nvSpPr>
+            <p:cNvPr id="45" name="Rectangle 44"/>
+            <p:cNvSpPr/>
+            <p:nvPr/>
+          </p:nvSpPr>
+          <p:spPr>
+            <a:xfrm>
+              <a:off x="4439920" y="370388"/>
+              <a:ext cx="4166270" cy="573196"/>
+            </a:xfrm>
+            <a:prstGeom prst="rect">
+              <a:avLst/>
+            </a:prstGeom>
+            <a:solidFill>
+              <a:schemeClr val="accent3">
+                <a:lumMod val="60000"/>
+                <a:lumOff val="40000"/>
+              </a:schemeClr>
+            </a:solidFill>
+            <a:ln>
+              <a:solidFill>
+                <a:schemeClr val="accent3"/>
+              </a:solidFill>
+            </a:ln>
+          </p:spPr>
+          <p:style>
+            <a:lnRef idx="2">
+              <a:schemeClr val="accent1">
+                <a:shade val="50000"/>
+              </a:schemeClr>
+            </a:lnRef>
+            <a:fillRef idx="1">
+              <a:schemeClr val="accent1"/>
+            </a:fillRef>
+            <a:effectRef idx="0">
+              <a:schemeClr val="accent1"/>
+            </a:effectRef>
+            <a:fontRef idx="minor">
+              <a:schemeClr val="lt1"/>
+            </a:fontRef>
+          </p:style>
+          <p:txBody>
+            <a:bodyPr rtlCol="0" anchor="ctr"/>
+            <a:lstStyle/>
+            <a:p>
+              <a:pPr algn="ctr"/>
+              <a:endParaRPr lang="en-US"/>
+            </a:p>
+          </p:txBody>
+        </p:sp>
+        <p:sp>
+          <p:nvSpPr>
+            <p:cNvPr id="141" name="Rectangle 140"/>
+            <p:cNvSpPr/>
+            <p:nvPr/>
+          </p:nvSpPr>
+          <p:spPr>
+            <a:xfrm>
+              <a:off x="6324600" y="953312"/>
+              <a:ext cx="381000" cy="71650"/>
+            </a:xfrm>
+            <a:prstGeom prst="rect">
+              <a:avLst/>
+            </a:prstGeom>
+            <a:solidFill>
+              <a:schemeClr val="accent2"/>
+            </a:solidFill>
+            <a:ln>
+              <a:solidFill>
+                <a:schemeClr val="accent2"/>
+              </a:solidFill>
+            </a:ln>
+          </p:spPr>
+          <p:style>
+            <a:lnRef idx="2">
+              <a:schemeClr val="accent1">
+                <a:shade val="50000"/>
+              </a:schemeClr>
+            </a:lnRef>
+            <a:fillRef idx="1">
+              <a:schemeClr val="accent1"/>
+            </a:fillRef>
+            <a:effectRef idx="0">
+              <a:schemeClr val="accent1"/>
+            </a:effectRef>
+            <a:fontRef idx="minor">
+              <a:schemeClr val="lt1"/>
+            </a:fontRef>
+          </p:style>
+          <p:txBody>
+            <a:bodyPr rtlCol="0" anchor="ctr"/>
+            <a:lstStyle/>
+            <a:p>
+              <a:pPr algn="ctr"/>
+              <a:endParaRPr lang="en-US"/>
+            </a:p>
+          </p:txBody>
+        </p:sp>
+        <p:sp>
+          <p:nvSpPr>
+            <p:cNvPr id="48" name="Trapezoid 47"/>
+            <p:cNvSpPr/>
+            <p:nvPr/>
+          </p:nvSpPr>
+          <p:spPr>
+            <a:xfrm>
+              <a:off x="4783530" y="1015234"/>
+              <a:ext cx="678567" cy="2337566"/>
+            </a:xfrm>
+            <a:prstGeom prst="trapezoid">
+              <a:avLst>
+                <a:gd name="adj" fmla="val 8543"/>
+              </a:avLst>
+            </a:prstGeom>
+            <a:solidFill>
+              <a:schemeClr val="bg1">
+                <a:lumMod val="75000"/>
+              </a:schemeClr>
+            </a:solidFill>
+            <a:ln w="12700">
+              <a:solidFill>
+                <a:schemeClr val="tx1"/>
+              </a:solidFill>
+            </a:ln>
+          </p:spPr>
+          <p:style>
+            <a:lnRef idx="2">
+              <a:schemeClr val="accent1">
+                <a:shade val="50000"/>
+              </a:schemeClr>
+            </a:lnRef>
+            <a:fillRef idx="1">
+              <a:schemeClr val="accent1"/>
+            </a:fillRef>
+            <a:effectRef idx="0">
+              <a:schemeClr val="accent1"/>
+            </a:effectRef>
+            <a:fontRef idx="minor">
+              <a:schemeClr val="lt1"/>
+            </a:fontRef>
+          </p:style>
+          <p:txBody>
+            <a:bodyPr rtlCol="0" anchor="ctr"/>
+            <a:lstStyle/>
+            <a:p>
+              <a:pPr algn="ctr"/>
+              <a:endParaRPr lang="en-US"/>
+            </a:p>
+          </p:txBody>
+        </p:sp>
+        <p:sp>
+          <p:nvSpPr>
+            <p:cNvPr id="51" name="Rectangle 50"/>
+            <p:cNvSpPr/>
+            <p:nvPr/>
+          </p:nvSpPr>
+          <p:spPr>
+            <a:xfrm>
+              <a:off x="4999114" y="943584"/>
+              <a:ext cx="247399" cy="71650"/>
+            </a:xfrm>
+            <a:prstGeom prst="rect">
+              <a:avLst/>
+            </a:prstGeom>
+            <a:solidFill>
+              <a:schemeClr val="bg2">
+                <a:lumMod val="25000"/>
+              </a:schemeClr>
+            </a:solidFill>
+            <a:ln>
+              <a:solidFill>
+                <a:schemeClr val="bg2">
+                  <a:lumMod val="50000"/>
+                </a:schemeClr>
+              </a:solidFill>
+            </a:ln>
+          </p:spPr>
+          <p:style>
+            <a:lnRef idx="2">
+              <a:schemeClr val="accent1">
+                <a:shade val="50000"/>
+              </a:schemeClr>
+            </a:lnRef>
+            <a:fillRef idx="1">
+              <a:schemeClr val="accent1"/>
+            </a:fillRef>
+            <a:effectRef idx="0">
+              <a:schemeClr val="accent1"/>
+            </a:effectRef>
+            <a:fontRef idx="minor">
+              <a:schemeClr val="lt1"/>
+            </a:fontRef>
+          </p:style>
+          <p:txBody>
+            <a:bodyPr rtlCol="0" anchor="ctr"/>
+            <a:lstStyle/>
+            <a:p>
+              <a:pPr algn="ctr"/>
+              <a:endParaRPr lang="en-US"/>
+            </a:p>
+          </p:txBody>
+        </p:sp>
+        <p:sp>
+          <p:nvSpPr>
+            <p:cNvPr id="52" name="Trapezoid 51"/>
+            <p:cNvSpPr/>
+            <p:nvPr/>
+          </p:nvSpPr>
+          <p:spPr>
+            <a:xfrm>
+              <a:off x="7574470" y="1015234"/>
+              <a:ext cx="678567" cy="2337566"/>
+            </a:xfrm>
+            <a:prstGeom prst="trapezoid">
+              <a:avLst>
+                <a:gd name="adj" fmla="val 8543"/>
+              </a:avLst>
+            </a:prstGeom>
+            <a:solidFill>
+              <a:schemeClr val="bg1">
+                <a:lumMod val="75000"/>
+              </a:schemeClr>
+            </a:solidFill>
+            <a:ln w="12700">
+              <a:solidFill>
+                <a:schemeClr val="tx1"/>
+              </a:solidFill>
+            </a:ln>
+          </p:spPr>
+          <p:style>
+            <a:lnRef idx="2">
+              <a:schemeClr val="accent1">
+                <a:shade val="50000"/>
+              </a:schemeClr>
+            </a:lnRef>
+            <a:fillRef idx="1">
+              <a:schemeClr val="accent1"/>
+            </a:fillRef>
+            <a:effectRef idx="0">
+              <a:schemeClr val="accent1"/>
+            </a:effectRef>
+            <a:fontRef idx="minor">
+              <a:schemeClr val="lt1"/>
+            </a:fontRef>
+          </p:style>
+          <p:txBody>
+            <a:bodyPr rtlCol="0" anchor="ctr"/>
+            <a:lstStyle/>
+            <a:p>
+              <a:pPr algn="ctr"/>
+              <a:endParaRPr lang="en-US"/>
+            </a:p>
+          </p:txBody>
+        </p:sp>
+        <p:sp>
+          <p:nvSpPr>
+            <p:cNvPr id="53" name="Rectangle 52"/>
+            <p:cNvSpPr/>
+            <p:nvPr/>
+          </p:nvSpPr>
+          <p:spPr>
+            <a:xfrm>
+              <a:off x="7790054" y="943584"/>
+              <a:ext cx="247399" cy="71650"/>
+            </a:xfrm>
+            <a:prstGeom prst="rect">
+              <a:avLst/>
+            </a:prstGeom>
+            <a:solidFill>
+              <a:schemeClr val="bg2">
+                <a:lumMod val="25000"/>
+              </a:schemeClr>
+            </a:solidFill>
+            <a:ln>
+              <a:solidFill>
+                <a:schemeClr val="bg2">
+                  <a:lumMod val="50000"/>
+                </a:schemeClr>
+              </a:solidFill>
+            </a:ln>
+          </p:spPr>
+          <p:style>
+            <a:lnRef idx="2">
+              <a:schemeClr val="accent1">
+                <a:shade val="50000"/>
+              </a:schemeClr>
+            </a:lnRef>
+            <a:fillRef idx="1">
+              <a:schemeClr val="accent1"/>
+            </a:fillRef>
+            <a:effectRef idx="0">
+              <a:schemeClr val="accent1"/>
+            </a:effectRef>
+            <a:fontRef idx="minor">
+              <a:schemeClr val="lt1"/>
+            </a:fontRef>
+          </p:style>
+          <p:txBody>
+            <a:bodyPr rtlCol="0" anchor="ctr"/>
+            <a:lstStyle/>
+            <a:p>
+              <a:pPr algn="ctr"/>
+              <a:endParaRPr lang="en-US"/>
+            </a:p>
+          </p:txBody>
+        </p:sp>
+        <p:sp>
+          <p:nvSpPr>
+            <p:cNvPr id="54" name="Isosceles Triangle 53"/>
+            <p:cNvSpPr/>
+            <p:nvPr/>
+          </p:nvSpPr>
+          <p:spPr>
+            <a:xfrm flipV="1">
+              <a:off x="6454333" y="943584"/>
+              <a:ext cx="137444" cy="143299"/>
+            </a:xfrm>
+            <a:prstGeom prst="triangle">
+              <a:avLst/>
+            </a:prstGeom>
+          </p:spPr>
+          <p:style>
+            <a:lnRef idx="2">
+              <a:schemeClr val="accent1">
+                <a:shade val="50000"/>
+              </a:schemeClr>
+            </a:lnRef>
+            <a:fillRef idx="1">
+              <a:schemeClr val="accent1"/>
+            </a:fillRef>
+            <a:effectRef idx="0">
+              <a:schemeClr val="accent1"/>
+            </a:effectRef>
+            <a:fontRef idx="minor">
+              <a:schemeClr val="lt1"/>
+            </a:fontRef>
+          </p:style>
+          <p:txBody>
+            <a:bodyPr rtlCol="0" anchor="ctr"/>
+            <a:lstStyle/>
+            <a:p>
+              <a:pPr algn="ctr"/>
+              <a:endParaRPr lang="en-US"/>
+            </a:p>
+          </p:txBody>
+        </p:sp>
+        <p:sp>
+          <p:nvSpPr>
+            <p:cNvPr id="55" name="Oval 54"/>
+            <p:cNvSpPr/>
+            <p:nvPr/>
+          </p:nvSpPr>
+          <p:spPr>
+            <a:xfrm>
+              <a:off x="5019731" y="549512"/>
+              <a:ext cx="206166" cy="214949"/>
+            </a:xfrm>
+            <a:prstGeom prst="ellipse">
+              <a:avLst/>
+            </a:prstGeom>
+          </p:spPr>
+          <p:style>
+            <a:lnRef idx="2">
+              <a:schemeClr val="accent1">
+                <a:shade val="50000"/>
+              </a:schemeClr>
+            </a:lnRef>
+            <a:fillRef idx="1">
+              <a:schemeClr val="accent1"/>
+            </a:fillRef>
+            <a:effectRef idx="0">
+              <a:schemeClr val="accent1"/>
+            </a:effectRef>
+            <a:fontRef idx="minor">
+              <a:schemeClr val="lt1"/>
+            </a:fontRef>
+          </p:style>
+          <p:txBody>
+            <a:bodyPr rtlCol="0" anchor="ctr"/>
+            <a:lstStyle/>
+            <a:p>
+              <a:pPr algn="ctr"/>
+              <a:endParaRPr lang="en-US"/>
+            </a:p>
+          </p:txBody>
+        </p:sp>
+        <p:sp>
+          <p:nvSpPr>
+            <p:cNvPr id="56" name="Oval 55"/>
+            <p:cNvSpPr/>
+            <p:nvPr/>
+          </p:nvSpPr>
+          <p:spPr>
+            <a:xfrm>
+              <a:off x="7810671" y="549512"/>
+              <a:ext cx="206166" cy="214949"/>
+            </a:xfrm>
+            <a:prstGeom prst="ellipse">
+              <a:avLst/>
+            </a:prstGeom>
+          </p:spPr>
+          <p:style>
+            <a:lnRef idx="2">
+              <a:schemeClr val="accent1">
+                <a:shade val="50000"/>
+              </a:schemeClr>
+            </a:lnRef>
+            <a:fillRef idx="1">
+              <a:schemeClr val="accent1"/>
+            </a:fillRef>
+            <a:effectRef idx="0">
+              <a:schemeClr val="accent1"/>
+            </a:effectRef>
+            <a:fontRef idx="minor">
+              <a:schemeClr val="lt1"/>
+            </a:fontRef>
+          </p:style>
+          <p:txBody>
+            <a:bodyPr rtlCol="0" anchor="ctr"/>
+            <a:lstStyle/>
+            <a:p>
+              <a:pPr algn="ctr"/>
+              <a:endParaRPr lang="en-US"/>
+            </a:p>
+          </p:txBody>
+        </p:sp>
+        <p:sp>
+          <p:nvSpPr>
+            <p:cNvPr id="57" name="Isosceles Triangle 56"/>
+            <p:cNvSpPr/>
+            <p:nvPr/>
+          </p:nvSpPr>
+          <p:spPr>
+            <a:xfrm rot="5400000" flipV="1">
+              <a:off x="4299548" y="588264"/>
+              <a:ext cx="143299" cy="137444"/>
+            </a:xfrm>
+            <a:prstGeom prst="triangle">
+              <a:avLst/>
+            </a:prstGeom>
+          </p:spPr>
+          <p:style>
+            <a:lnRef idx="2">
+              <a:schemeClr val="accent1">
+                <a:shade val="50000"/>
+              </a:schemeClr>
+            </a:lnRef>
+            <a:fillRef idx="1">
+              <a:schemeClr val="accent1"/>
+            </a:fillRef>
+            <a:effectRef idx="0">
+              <a:schemeClr val="accent1"/>
+            </a:effectRef>
+            <a:fontRef idx="minor">
+              <a:schemeClr val="lt1"/>
+            </a:fontRef>
+          </p:style>
+          <p:txBody>
+            <a:bodyPr rtlCol="0" anchor="ctr"/>
+            <a:lstStyle/>
+            <a:p>
+              <a:pPr algn="ctr"/>
+              <a:endParaRPr lang="en-US"/>
+            </a:p>
+          </p:txBody>
+        </p:sp>
+        <p:sp>
+          <p:nvSpPr>
+            <p:cNvPr id="58" name="Oval 57"/>
+            <p:cNvSpPr/>
+            <p:nvPr/>
+          </p:nvSpPr>
+          <p:spPr>
+            <a:xfrm>
+              <a:off x="5019731" y="1212270"/>
+              <a:ext cx="206166" cy="214949"/>
+            </a:xfrm>
+            <a:prstGeom prst="ellipse">
+              <a:avLst/>
+            </a:prstGeom>
+          </p:spPr>
+          <p:style>
+            <a:lnRef idx="2">
+              <a:schemeClr val="accent1">
+                <a:shade val="50000"/>
+              </a:schemeClr>
+            </a:lnRef>
+            <a:fillRef idx="1">
+              <a:schemeClr val="accent1"/>
+            </a:fillRef>
+            <a:effectRef idx="0">
+              <a:schemeClr val="accent1"/>
+            </a:effectRef>
+            <a:fontRef idx="minor">
+              <a:schemeClr val="lt1"/>
+            </a:fontRef>
+          </p:style>
+          <p:txBody>
+            <a:bodyPr rtlCol="0" anchor="ctr"/>
+            <a:lstStyle/>
+            <a:p>
+              <a:pPr algn="ctr"/>
+              <a:endParaRPr lang="en-US"/>
+            </a:p>
+          </p:txBody>
+        </p:sp>
+        <p:sp>
+          <p:nvSpPr>
+            <p:cNvPr id="59" name="Isosceles Triangle 58"/>
+            <p:cNvSpPr/>
+            <p:nvPr/>
+          </p:nvSpPr>
+          <p:spPr>
+            <a:xfrm rot="5400000" flipV="1">
+              <a:off x="4703290" y="1251022"/>
+              <a:ext cx="143299" cy="137444"/>
+            </a:xfrm>
+            <a:prstGeom prst="triangle">
+              <a:avLst/>
+            </a:prstGeom>
+          </p:spPr>
+          <p:style>
+            <a:lnRef idx="2">
+              <a:schemeClr val="accent1">
+                <a:shade val="50000"/>
+              </a:schemeClr>
+            </a:lnRef>
+            <a:fillRef idx="1">
+              <a:schemeClr val="accent1"/>
+            </a:fillRef>
+            <a:effectRef idx="0">
+              <a:schemeClr val="accent1"/>
+            </a:effectRef>
+            <a:fontRef idx="minor">
+              <a:schemeClr val="lt1"/>
+            </a:fontRef>
+          </p:style>
+          <p:txBody>
+            <a:bodyPr rtlCol="0" anchor="ctr"/>
+            <a:lstStyle/>
+            <a:p>
+              <a:pPr algn="ctr"/>
+              <a:endParaRPr lang="en-US"/>
+            </a:p>
+          </p:txBody>
+        </p:sp>
+        <p:sp>
+          <p:nvSpPr>
+            <p:cNvPr id="60" name="Oval 59"/>
+            <p:cNvSpPr/>
+            <p:nvPr/>
+          </p:nvSpPr>
+          <p:spPr>
+            <a:xfrm>
+              <a:off x="7810671" y="1212270"/>
+              <a:ext cx="206166" cy="214949"/>
+            </a:xfrm>
+            <a:prstGeom prst="ellipse">
+              <a:avLst/>
+            </a:prstGeom>
+          </p:spPr>
+          <p:style>
+            <a:lnRef idx="2">
+              <a:schemeClr val="accent1">
+                <a:shade val="50000"/>
+              </a:schemeClr>
+            </a:lnRef>
+            <a:fillRef idx="1">
+              <a:schemeClr val="accent1"/>
+            </a:fillRef>
+            <a:effectRef idx="0">
+              <a:schemeClr val="accent1"/>
+            </a:effectRef>
+            <a:fontRef idx="minor">
+              <a:schemeClr val="lt1"/>
+            </a:fontRef>
+          </p:style>
+          <p:txBody>
+            <a:bodyPr rtlCol="0" anchor="ctr"/>
+            <a:lstStyle/>
+            <a:p>
+              <a:pPr algn="ctr"/>
+              <a:endParaRPr lang="en-US"/>
+            </a:p>
+          </p:txBody>
+        </p:sp>
+        <p:sp>
+          <p:nvSpPr>
+            <p:cNvPr id="61" name="Isosceles Triangle 60"/>
+            <p:cNvSpPr/>
+            <p:nvPr/>
+          </p:nvSpPr>
+          <p:spPr>
+            <a:xfrm rot="5400000" flipV="1">
+              <a:off x="7481314" y="1251022"/>
+              <a:ext cx="143299" cy="137444"/>
+            </a:xfrm>
+            <a:prstGeom prst="triangle">
+              <a:avLst/>
+            </a:prstGeom>
+          </p:spPr>
+          <p:style>
+            <a:lnRef idx="2">
+              <a:schemeClr val="accent1">
+                <a:shade val="50000"/>
+              </a:schemeClr>
+            </a:lnRef>
+            <a:fillRef idx="1">
+              <a:schemeClr val="accent1"/>
+            </a:fillRef>
+            <a:effectRef idx="0">
+              <a:schemeClr val="accent1"/>
+            </a:effectRef>
+            <a:fontRef idx="minor">
+              <a:schemeClr val="lt1"/>
+            </a:fontRef>
+          </p:style>
+          <p:txBody>
+            <a:bodyPr rtlCol="0" anchor="ctr"/>
+            <a:lstStyle/>
+            <a:p>
+              <a:pPr algn="ctr"/>
+              <a:endParaRPr lang="en-US"/>
+            </a:p>
+          </p:txBody>
+        </p:sp>
+        <p:sp>
+          <p:nvSpPr>
+            <p:cNvPr id="62" name="Oval 61"/>
+            <p:cNvSpPr/>
+            <p:nvPr/>
+          </p:nvSpPr>
+          <p:spPr>
+            <a:xfrm>
+              <a:off x="5019731" y="2340750"/>
+              <a:ext cx="206166" cy="214949"/>
+            </a:xfrm>
+            <a:prstGeom prst="ellipse">
+              <a:avLst/>
+            </a:prstGeom>
+          </p:spPr>
+          <p:style>
+            <a:lnRef idx="2">
+              <a:schemeClr val="accent1">
+                <a:shade val="50000"/>
+              </a:schemeClr>
+            </a:lnRef>
+            <a:fillRef idx="1">
+              <a:schemeClr val="accent1"/>
+            </a:fillRef>
+            <a:effectRef idx="0">
+              <a:schemeClr val="accent1"/>
+            </a:effectRef>
+            <a:fontRef idx="minor">
+              <a:schemeClr val="lt1"/>
+            </a:fontRef>
+          </p:style>
+          <p:txBody>
+            <a:bodyPr rtlCol="0" anchor="ctr"/>
+            <a:lstStyle/>
+            <a:p>
+              <a:pPr algn="ctr"/>
+              <a:endParaRPr lang="en-US"/>
+            </a:p>
+          </p:txBody>
+        </p:sp>
+        <p:sp>
+          <p:nvSpPr>
+            <p:cNvPr id="63" name="Isosceles Triangle 62"/>
+            <p:cNvSpPr/>
+            <p:nvPr/>
+          </p:nvSpPr>
+          <p:spPr>
+            <a:xfrm rot="5400000" flipV="1">
+              <a:off x="4648375" y="2379503"/>
+              <a:ext cx="143299" cy="137444"/>
+            </a:xfrm>
+            <a:prstGeom prst="triangle">
+              <a:avLst/>
+            </a:prstGeom>
+          </p:spPr>
+          <p:style>
+            <a:lnRef idx="2">
+              <a:schemeClr val="accent1">
+                <a:shade val="50000"/>
+              </a:schemeClr>
+            </a:lnRef>
+            <a:fillRef idx="1">
+              <a:schemeClr val="accent1"/>
+            </a:fillRef>
+            <a:effectRef idx="0">
+              <a:schemeClr val="accent1"/>
+            </a:effectRef>
+            <a:fontRef idx="minor">
+              <a:schemeClr val="lt1"/>
+            </a:fontRef>
+          </p:style>
+          <p:txBody>
+            <a:bodyPr rtlCol="0" anchor="ctr"/>
+            <a:lstStyle/>
+            <a:p>
+              <a:pPr algn="ctr"/>
+              <a:endParaRPr lang="en-US"/>
+            </a:p>
+          </p:txBody>
+        </p:sp>
+        <p:sp>
+          <p:nvSpPr>
+            <p:cNvPr id="64" name="Oval 63"/>
+            <p:cNvSpPr/>
+            <p:nvPr/>
+          </p:nvSpPr>
+          <p:spPr>
+            <a:xfrm>
+              <a:off x="7810671" y="2340750"/>
+              <a:ext cx="206166" cy="214949"/>
+            </a:xfrm>
+            <a:prstGeom prst="ellipse">
+              <a:avLst/>
+            </a:prstGeom>
+          </p:spPr>
+          <p:style>
+            <a:lnRef idx="2">
+              <a:schemeClr val="accent1">
+                <a:shade val="50000"/>
+              </a:schemeClr>
+            </a:lnRef>
+            <a:fillRef idx="1">
+              <a:schemeClr val="accent1"/>
+            </a:fillRef>
+            <a:effectRef idx="0">
+              <a:schemeClr val="accent1"/>
+            </a:effectRef>
+            <a:fontRef idx="minor">
+              <a:schemeClr val="lt1"/>
+            </a:fontRef>
+          </p:style>
+          <p:txBody>
+            <a:bodyPr rtlCol="0" anchor="ctr"/>
+            <a:lstStyle/>
+            <a:p>
+              <a:pPr algn="ctr"/>
+              <a:endParaRPr lang="en-US"/>
+            </a:p>
+          </p:txBody>
+        </p:sp>
+        <p:sp>
+          <p:nvSpPr>
+            <p:cNvPr id="65" name="Isosceles Triangle 64"/>
+            <p:cNvSpPr/>
+            <p:nvPr/>
+          </p:nvSpPr>
+          <p:spPr>
+            <a:xfrm rot="5400000" flipV="1">
+              <a:off x="7434989" y="2379503"/>
+              <a:ext cx="143299" cy="137444"/>
+            </a:xfrm>
+            <a:prstGeom prst="triangle">
+              <a:avLst/>
+            </a:prstGeom>
+          </p:spPr>
+          <p:style>
+            <a:lnRef idx="2">
+              <a:schemeClr val="accent1">
+                <a:shade val="50000"/>
+              </a:schemeClr>
+            </a:lnRef>
+            <a:fillRef idx="1">
+              <a:schemeClr val="accent1"/>
+            </a:fillRef>
+            <a:effectRef idx="0">
+              <a:schemeClr val="accent1"/>
+            </a:effectRef>
+            <a:fontRef idx="minor">
+              <a:schemeClr val="lt1"/>
+            </a:fontRef>
+          </p:style>
+          <p:txBody>
+            <a:bodyPr rtlCol="0" anchor="ctr"/>
+            <a:lstStyle/>
+            <a:p>
+              <a:pPr algn="ctr"/>
+              <a:endParaRPr lang="en-US"/>
+            </a:p>
+          </p:txBody>
+        </p:sp>
+        <p:sp>
+          <p:nvSpPr>
+            <p:cNvPr id="17" name="Rectangle 16"/>
+            <p:cNvSpPr/>
+            <p:nvPr/>
+          </p:nvSpPr>
+          <p:spPr>
+            <a:xfrm>
+              <a:off x="6324600" y="585336"/>
+              <a:ext cx="381000" cy="71650"/>
+            </a:xfrm>
+            <a:prstGeom prst="rect">
+              <a:avLst/>
+            </a:prstGeom>
+            <a:solidFill>
+              <a:schemeClr val="accent2"/>
+            </a:solidFill>
+            <a:ln>
+              <a:solidFill>
+                <a:schemeClr val="accent2"/>
+              </a:solidFill>
+            </a:ln>
+          </p:spPr>
+          <p:style>
+            <a:lnRef idx="2">
+              <a:schemeClr val="accent1">
+                <a:shade val="50000"/>
+              </a:schemeClr>
+            </a:lnRef>
+            <a:fillRef idx="1">
+              <a:schemeClr val="accent1"/>
+            </a:fillRef>
+            <a:effectRef idx="0">
+              <a:schemeClr val="accent1"/>
+            </a:effectRef>
+            <a:fontRef idx="minor">
+              <a:schemeClr val="lt1"/>
+            </a:fontRef>
+          </p:style>
+          <p:txBody>
+            <a:bodyPr rtlCol="0" anchor="ctr"/>
+            <a:lstStyle/>
+            <a:p>
+              <a:pPr algn="ctr"/>
+              <a:endParaRPr lang="en-US"/>
+            </a:p>
+          </p:txBody>
+        </p:sp>
+        <p:sp>
+          <p:nvSpPr>
+            <p:cNvPr id="74" name="Oval 73"/>
+            <p:cNvSpPr/>
+            <p:nvPr/>
+          </p:nvSpPr>
+          <p:spPr>
+            <a:xfrm>
+              <a:off x="6412017" y="513686"/>
+              <a:ext cx="206166" cy="214949"/>
+            </a:xfrm>
+            <a:prstGeom prst="ellipse">
+              <a:avLst/>
+            </a:prstGeom>
+          </p:spPr>
+          <p:style>
+            <a:lnRef idx="2">
+              <a:schemeClr val="accent1">
+                <a:shade val="50000"/>
+              </a:schemeClr>
+            </a:lnRef>
+            <a:fillRef idx="1">
+              <a:schemeClr val="accent1"/>
+            </a:fillRef>
+            <a:effectRef idx="0">
+              <a:schemeClr val="accent1"/>
+            </a:effectRef>
+            <a:fontRef idx="minor">
+              <a:schemeClr val="lt1"/>
+            </a:fontRef>
+          </p:style>
+          <p:txBody>
+            <a:bodyPr rtlCol="0" anchor="ctr"/>
+            <a:lstStyle/>
+            <a:p>
+              <a:pPr algn="ctr"/>
+              <a:endParaRPr lang="en-US"/>
+            </a:p>
+          </p:txBody>
+        </p:sp>
+        <p:cxnSp>
+          <p:nvCxnSpPr>
+            <p:cNvPr id="34" name="Straight Arrow Connector 33"/>
+            <p:cNvCxnSpPr/>
+            <p:nvPr/>
+          </p:nvCxnSpPr>
+          <p:spPr>
+            <a:xfrm flipV="1">
+              <a:off x="5635102" y="979409"/>
+              <a:ext cx="0" cy="340335"/>
+            </a:xfrm>
+            <a:prstGeom prst="straightConnector1">
+              <a:avLst/>
+            </a:prstGeom>
+            <a:ln>
+              <a:solidFill>
+                <a:schemeClr val="tx1"/>
+              </a:solidFill>
+              <a:headEnd type="arrow"/>
+              <a:tailEnd type="arrow"/>
+            </a:ln>
+          </p:spPr>
+          <p:style>
+            <a:lnRef idx="1">
+              <a:schemeClr val="accent1"/>
+            </a:lnRef>
+            <a:fillRef idx="0">
+              <a:schemeClr val="accent1"/>
+            </a:fillRef>
+            <a:effectRef idx="0">
+              <a:schemeClr val="accent1"/>
+            </a:effectRef>
+            <a:fontRef idx="minor">
+              <a:schemeClr val="tx1"/>
+            </a:fontRef>
+          </p:style>
+        </p:cxnSp>
+        <p:cxnSp>
+          <p:nvCxnSpPr>
+            <p:cNvPr id="98" name="Straight Arrow Connector 97"/>
+            <p:cNvCxnSpPr/>
+            <p:nvPr/>
+          </p:nvCxnSpPr>
+          <p:spPr>
+            <a:xfrm flipV="1">
+              <a:off x="8534400" y="977880"/>
+              <a:ext cx="0" cy="1470344"/>
+            </a:xfrm>
+            <a:prstGeom prst="straightConnector1">
+              <a:avLst/>
+            </a:prstGeom>
+            <a:ln>
+              <a:solidFill>
+                <a:schemeClr val="tx1"/>
+              </a:solidFill>
+              <a:headEnd type="arrow"/>
+              <a:tailEnd type="arrow"/>
+            </a:ln>
+          </p:spPr>
+          <p:style>
+            <a:lnRef idx="1">
+              <a:schemeClr val="accent1"/>
+            </a:lnRef>
+            <a:fillRef idx="0">
+              <a:schemeClr val="accent1"/>
+            </a:fillRef>
+            <a:effectRef idx="0">
+              <a:schemeClr val="accent1"/>
+            </a:effectRef>
+            <a:fontRef idx="minor">
+              <a:schemeClr val="tx1"/>
+            </a:fontRef>
+          </p:style>
+        </p:cxnSp>
+        <p:cxnSp>
+          <p:nvCxnSpPr>
+            <p:cNvPr id="44" name="Straight Connector 43"/>
+            <p:cNvCxnSpPr>
+              <a:stCxn id="58" idx="6"/>
+            </p:cNvCxnSpPr>
+            <p:nvPr/>
+          </p:nvCxnSpPr>
+          <p:spPr>
+            <a:xfrm flipV="1">
+              <a:off x="5225897" y="1319744"/>
+              <a:ext cx="651051" cy="1"/>
+            </a:xfrm>
+            <a:prstGeom prst="line">
+              <a:avLst/>
+            </a:prstGeom>
+            <a:ln>
+              <a:solidFill>
+                <a:schemeClr val="tx1"/>
+              </a:solidFill>
+            </a:ln>
+          </p:spPr>
+          <p:style>
+            <a:lnRef idx="1">
+              <a:schemeClr val="accent1"/>
+            </a:lnRef>
+            <a:fillRef idx="0">
+              <a:schemeClr val="accent1"/>
+            </a:fillRef>
+            <a:effectRef idx="0">
+              <a:schemeClr val="accent1"/>
+            </a:effectRef>
+            <a:fontRef idx="minor">
+              <a:schemeClr val="tx1"/>
+            </a:fontRef>
+          </p:style>
+        </p:cxnSp>
+        <p:cxnSp>
+          <p:nvCxnSpPr>
+            <p:cNvPr id="99" name="Straight Connector 98"/>
+            <p:cNvCxnSpPr/>
+            <p:nvPr/>
+          </p:nvCxnSpPr>
+          <p:spPr>
+            <a:xfrm>
+              <a:off x="7883349" y="2448225"/>
+              <a:ext cx="803451" cy="0"/>
+            </a:xfrm>
+            <a:prstGeom prst="line">
+              <a:avLst/>
+            </a:prstGeom>
+            <a:ln>
+              <a:solidFill>
+                <a:schemeClr val="tx1"/>
+              </a:solidFill>
+            </a:ln>
+          </p:spPr>
+          <p:style>
+            <a:lnRef idx="1">
+              <a:schemeClr val="accent1"/>
+            </a:lnRef>
+            <a:fillRef idx="0">
+              <a:schemeClr val="accent1"/>
+            </a:fillRef>
+            <a:effectRef idx="0">
+              <a:schemeClr val="accent1"/>
+            </a:effectRef>
+            <a:fontRef idx="minor">
+              <a:schemeClr val="tx1"/>
+            </a:fontRef>
+          </p:style>
+        </p:cxnSp>
+        <p:sp>
+          <p:nvSpPr>
+            <p:cNvPr id="47" name="TextBox 46"/>
+            <p:cNvSpPr txBox="1"/>
+            <p:nvPr/>
+          </p:nvSpPr>
+          <p:spPr>
+            <a:xfrm>
+              <a:off x="5617720" y="966594"/>
+              <a:ext cx="533400" cy="369332"/>
+            </a:xfrm>
+            <a:prstGeom prst="rect">
+              <a:avLst/>
+            </a:prstGeom>
+            <a:noFill/>
+          </p:spPr>
+          <p:txBody>
+            <a:bodyPr wrap="square" rtlCol="0">
+              <a:spAutoFit/>
+            </a:bodyPr>
+            <a:lstStyle/>
+            <a:p>
+              <a:r>
+                <a:rPr lang="en-US" dirty="0" smtClean="0"/>
+                <a:t>3’</a:t>
+              </a:r>
+              <a:endParaRPr lang="en-US" dirty="0"/>
+            </a:p>
+          </p:txBody>
+        </p:sp>
+        <p:sp>
+          <p:nvSpPr>
+            <p:cNvPr id="100" name="TextBox 99"/>
+            <p:cNvSpPr txBox="1"/>
+            <p:nvPr/>
+          </p:nvSpPr>
+          <p:spPr>
+            <a:xfrm>
+              <a:off x="8494319" y="1528386"/>
+              <a:ext cx="533400" cy="369332"/>
+            </a:xfrm>
+            <a:prstGeom prst="rect">
+              <a:avLst/>
+            </a:prstGeom>
+            <a:noFill/>
+          </p:spPr>
+          <p:txBody>
+            <a:bodyPr wrap="square" rtlCol="0">
+              <a:spAutoFit/>
+            </a:bodyPr>
+            <a:lstStyle/>
+            <a:p>
+              <a:r>
+                <a:rPr lang="en-US" dirty="0" smtClean="0"/>
+                <a:t>15’</a:t>
+              </a:r>
+              <a:endParaRPr lang="en-US" dirty="0"/>
+            </a:p>
+          </p:txBody>
+        </p:sp>
+        <p:sp>
+          <p:nvSpPr>
+            <p:cNvPr id="140" name="Rectangle 139"/>
+            <p:cNvSpPr/>
+            <p:nvPr/>
+          </p:nvSpPr>
+          <p:spPr>
+            <a:xfrm>
+              <a:off x="6324600" y="285344"/>
+              <a:ext cx="381000" cy="71650"/>
+            </a:xfrm>
+            <a:prstGeom prst="rect">
+              <a:avLst/>
+            </a:prstGeom>
+            <a:solidFill>
+              <a:schemeClr val="accent2"/>
+            </a:solidFill>
+            <a:ln>
+              <a:solidFill>
+                <a:schemeClr val="accent2"/>
+              </a:solidFill>
+            </a:ln>
+          </p:spPr>
+          <p:style>
+            <a:lnRef idx="2">
+              <a:schemeClr val="accent1">
+                <a:shade val="50000"/>
+              </a:schemeClr>
+            </a:lnRef>
+            <a:fillRef idx="1">
+              <a:schemeClr val="accent1"/>
+            </a:fillRef>
+            <a:effectRef idx="0">
+              <a:schemeClr val="accent1"/>
+            </a:effectRef>
+            <a:fontRef idx="minor">
+              <a:schemeClr val="lt1"/>
+            </a:fontRef>
+          </p:style>
+          <p:txBody>
+            <a:bodyPr rtlCol="0" anchor="ctr"/>
+            <a:lstStyle/>
+            <a:p>
+              <a:pPr algn="ctr"/>
+              <a:endParaRPr lang="en-US"/>
+            </a:p>
+          </p:txBody>
+        </p:sp>
+        <p:sp>
+          <p:nvSpPr>
+            <p:cNvPr id="153" name="Rectangle 152"/>
+            <p:cNvSpPr/>
+            <p:nvPr/>
+          </p:nvSpPr>
+          <p:spPr>
+            <a:xfrm>
+              <a:off x="6057088" y="1897718"/>
+              <a:ext cx="914400" cy="843926"/>
+            </a:xfrm>
+            <a:prstGeom prst="rect">
+              <a:avLst/>
+            </a:prstGeom>
+            <a:solidFill>
+              <a:schemeClr val="accent3">
+                <a:lumMod val="60000"/>
+                <a:lumOff val="40000"/>
+              </a:schemeClr>
+            </a:solidFill>
+            <a:ln>
+              <a:solidFill>
+                <a:schemeClr val="accent3"/>
+              </a:solidFill>
+            </a:ln>
+          </p:spPr>
+          <p:style>
+            <a:lnRef idx="2">
+              <a:schemeClr val="accent1">
+                <a:shade val="50000"/>
+              </a:schemeClr>
+            </a:lnRef>
+            <a:fillRef idx="1">
+              <a:schemeClr val="accent1"/>
+            </a:fillRef>
+            <a:effectRef idx="0">
+              <a:schemeClr val="accent1"/>
+            </a:effectRef>
+            <a:fontRef idx="minor">
+              <a:schemeClr val="lt1"/>
+            </a:fontRef>
+          </p:style>
+          <p:txBody>
+            <a:bodyPr rtlCol="0" anchor="ctr"/>
+            <a:lstStyle/>
+            <a:p>
+              <a:pPr algn="ctr"/>
+              <a:r>
+                <a:rPr lang="en-US" sz="1100" b="1" dirty="0" smtClean="0">
+                  <a:solidFill>
+                    <a:schemeClr val="tx1"/>
+                  </a:solidFill>
+                </a:rPr>
+                <a:t>X-Section</a:t>
+              </a:r>
+              <a:endParaRPr lang="en-US" sz="1100" b="1" dirty="0">
+                <a:solidFill>
+                  <a:schemeClr val="tx1"/>
+                </a:solidFill>
+              </a:endParaRPr>
+            </a:p>
+          </p:txBody>
+        </p:sp>
+        <p:sp>
+          <p:nvSpPr>
+            <p:cNvPr id="154" name="Isosceles Triangle 153"/>
+            <p:cNvSpPr/>
+            <p:nvPr/>
+          </p:nvSpPr>
+          <p:spPr>
+            <a:xfrm flipV="1">
+              <a:off x="6361888" y="2755758"/>
+              <a:ext cx="137444" cy="143299"/>
+            </a:xfrm>
+            <a:prstGeom prst="triangle">
+              <a:avLst/>
+            </a:prstGeom>
+          </p:spPr>
+          <p:style>
+            <a:lnRef idx="2">
+              <a:schemeClr val="accent1">
+                <a:shade val="50000"/>
+              </a:schemeClr>
+            </a:lnRef>
+            <a:fillRef idx="1">
+              <a:schemeClr val="accent1"/>
+            </a:fillRef>
+            <a:effectRef idx="0">
+              <a:schemeClr val="accent1"/>
+            </a:effectRef>
+            <a:fontRef idx="minor">
+              <a:schemeClr val="lt1"/>
+            </a:fontRef>
+          </p:style>
+          <p:txBody>
+            <a:bodyPr rtlCol="0" anchor="ctr"/>
+            <a:lstStyle/>
+            <a:p>
+              <a:pPr algn="ctr"/>
+              <a:endParaRPr lang="en-US"/>
+            </a:p>
+          </p:txBody>
+        </p:sp>
+        <p:sp>
+          <p:nvSpPr>
+            <p:cNvPr id="155" name="Rectangle 154"/>
+            <p:cNvSpPr/>
+            <p:nvPr/>
+          </p:nvSpPr>
+          <p:spPr>
+            <a:xfrm>
+              <a:off x="6525505" y="2751372"/>
+              <a:ext cx="141183" cy="150843"/>
+            </a:xfrm>
+            <a:prstGeom prst="rect">
+              <a:avLst/>
+            </a:prstGeom>
+            <a:solidFill>
+              <a:schemeClr val="accent2"/>
+            </a:solidFill>
+            <a:ln>
+              <a:solidFill>
+                <a:schemeClr val="accent2"/>
+              </a:solidFill>
+            </a:ln>
+          </p:spPr>
+          <p:style>
+            <a:lnRef idx="2">
+              <a:schemeClr val="accent1">
+                <a:shade val="50000"/>
+              </a:schemeClr>
+            </a:lnRef>
+            <a:fillRef idx="1">
+              <a:schemeClr val="accent1"/>
+            </a:fillRef>
+            <a:effectRef idx="0">
+              <a:schemeClr val="accent1"/>
+            </a:effectRef>
+            <a:fontRef idx="minor">
+              <a:schemeClr val="lt1"/>
+            </a:fontRef>
+          </p:style>
+          <p:txBody>
+            <a:bodyPr rtlCol="0" anchor="ctr"/>
+            <a:lstStyle/>
+            <a:p>
+              <a:pPr algn="ctr"/>
+              <a:endParaRPr lang="en-US"/>
+            </a:p>
+          </p:txBody>
+        </p:sp>
+        <p:sp>
+          <p:nvSpPr>
+            <p:cNvPr id="156" name="Rectangle 155"/>
+            <p:cNvSpPr/>
+            <p:nvPr/>
+          </p:nvSpPr>
+          <p:spPr>
+            <a:xfrm>
+              <a:off x="6443697" y="1746875"/>
+              <a:ext cx="141183" cy="150843"/>
+            </a:xfrm>
+            <a:prstGeom prst="rect">
+              <a:avLst/>
+            </a:prstGeom>
+            <a:solidFill>
+              <a:schemeClr val="accent2"/>
+            </a:solidFill>
+            <a:ln>
+              <a:solidFill>
+                <a:schemeClr val="accent2"/>
+              </a:solidFill>
+            </a:ln>
+          </p:spPr>
+          <p:style>
+            <a:lnRef idx="2">
+              <a:schemeClr val="accent1">
+                <a:shade val="50000"/>
+              </a:schemeClr>
+            </a:lnRef>
+            <a:fillRef idx="1">
+              <a:schemeClr val="accent1"/>
+            </a:fillRef>
+            <a:effectRef idx="0">
+              <a:schemeClr val="accent1"/>
+            </a:effectRef>
+            <a:fontRef idx="minor">
+              <a:schemeClr val="lt1"/>
+            </a:fontRef>
+          </p:style>
+          <p:txBody>
+            <a:bodyPr rtlCol="0" anchor="ctr"/>
+            <a:lstStyle/>
+            <a:p>
+              <a:pPr algn="ctr"/>
+              <a:endParaRPr lang="en-US"/>
+            </a:p>
+          </p:txBody>
+        </p:sp>
+        <p:grpSp>
+          <p:nvGrpSpPr>
+            <p:cNvPr id="159" name="Group 158"/>
+            <p:cNvGrpSpPr/>
+            <p:nvPr/>
+          </p:nvGrpSpPr>
+          <p:grpSpPr>
+            <a:xfrm>
+              <a:off x="6976037" y="2167281"/>
+              <a:ext cx="143299" cy="304800"/>
+              <a:chOff x="7014949" y="2133600"/>
+              <a:chExt cx="143299" cy="304800"/>
+            </a:xfrm>
+          </p:grpSpPr>
+          <p:sp>
+            <p:nvSpPr>
+              <p:cNvPr id="157" name="Rectangle 156"/>
+              <p:cNvSpPr/>
+              <p:nvPr/>
+            </p:nvSpPr>
+            <p:spPr>
+              <a:xfrm>
+                <a:off x="7016973" y="2133600"/>
+                <a:ext cx="141183" cy="150843"/>
+              </a:xfrm>
+              <a:prstGeom prst="rect">
+                <a:avLst/>
+              </a:prstGeom>
+              <a:solidFill>
+                <a:schemeClr val="accent2"/>
+              </a:solidFill>
+              <a:ln>
+                <a:solidFill>
+                  <a:schemeClr val="accent2"/>
+                </a:solidFill>
+              </a:ln>
+            </p:spPr>
+            <p:style>
+              <a:lnRef idx="2">
+                <a:schemeClr val="accent1">
+                  <a:shade val="50000"/>
+                </a:schemeClr>
+              </a:lnRef>
+              <a:fillRef idx="1">
+                <a:schemeClr val="accent1"/>
+              </a:fillRef>
+              <a:effectRef idx="0">
+                <a:schemeClr val="accent1"/>
+              </a:effectRef>
+              <a:fontRef idx="minor">
+                <a:schemeClr val="lt1"/>
+              </a:fontRef>
+            </p:style>
+            <p:txBody>
+              <a:bodyPr rtlCol="0" anchor="ctr"/>
+              <a:lstStyle/>
+              <a:p>
+                <a:pPr algn="ctr"/>
+                <a:endParaRPr lang="en-US"/>
+              </a:p>
+            </p:txBody>
+          </p:sp>
+          <p:sp>
+            <p:nvSpPr>
+              <p:cNvPr id="158" name="Isosceles Triangle 157"/>
+              <p:cNvSpPr/>
+              <p:nvPr/>
+            </p:nvSpPr>
+            <p:spPr>
+              <a:xfrm rot="16200000" flipV="1">
+                <a:off x="7017877" y="2298028"/>
+                <a:ext cx="137444" cy="143299"/>
+              </a:xfrm>
+              <a:prstGeom prst="triangle">
+                <a:avLst/>
+              </a:prstGeom>
+            </p:spPr>
+            <p:style>
+              <a:lnRef idx="2">
+                <a:schemeClr val="accent1">
+                  <a:shade val="50000"/>
+                </a:schemeClr>
+              </a:lnRef>
+              <a:fillRef idx="1">
+                <a:schemeClr val="accent1"/>
+              </a:fillRef>
+              <a:effectRef idx="0">
+                <a:schemeClr val="accent1"/>
+              </a:effectRef>
+              <a:fontRef idx="minor">
+                <a:schemeClr val="lt1"/>
+              </a:fontRef>
+            </p:style>
+            <p:txBody>
+              <a:bodyPr rtlCol="0" anchor="ctr"/>
+              <a:lstStyle/>
+              <a:p>
+                <a:pPr algn="ctr"/>
+                <a:endParaRPr lang="en-US"/>
+              </a:p>
+            </p:txBody>
+          </p:sp>
+        </p:grpSp>
+        <p:sp>
+          <p:nvSpPr>
+            <p:cNvPr id="160" name="Rounded Rectangle 159"/>
+            <p:cNvSpPr/>
+            <p:nvPr/>
+          </p:nvSpPr>
+          <p:spPr>
+            <a:xfrm>
+              <a:off x="5999066" y="76200"/>
+              <a:ext cx="1011334" cy="1171894"/>
+            </a:xfrm>
+            <a:prstGeom prst="roundRect">
+              <a:avLst/>
+            </a:prstGeom>
+            <a:noFill/>
+            <a:ln>
+              <a:solidFill>
+                <a:srgbClr val="C00000"/>
+              </a:solidFill>
+            </a:ln>
+          </p:spPr>
+          <p:style>
+            <a:lnRef idx="2">
+              <a:schemeClr val="accent1">
+                <a:shade val="50000"/>
+              </a:schemeClr>
+            </a:lnRef>
+            <a:fillRef idx="1">
+              <a:schemeClr val="accent1"/>
+            </a:fillRef>
+            <a:effectRef idx="0">
+              <a:schemeClr val="accent1"/>
+            </a:effectRef>
+            <a:fontRef idx="minor">
+              <a:schemeClr val="lt1"/>
+            </a:fontRef>
+          </p:style>
+          <p:txBody>
+            <a:bodyPr rtlCol="0" anchor="ctr"/>
+            <a:lstStyle/>
+            <a:p>
+              <a:pPr algn="ctr"/>
+              <a:endParaRPr lang="en-US"/>
+            </a:p>
+          </p:txBody>
+        </p:sp>
+        <p:cxnSp>
+          <p:nvCxnSpPr>
+            <p:cNvPr id="162" name="Straight Arrow Connector 161"/>
+            <p:cNvCxnSpPr>
+              <a:stCxn id="160" idx="2"/>
+            </p:cNvCxnSpPr>
+            <p:nvPr/>
+          </p:nvCxnSpPr>
+          <p:spPr>
+            <a:xfrm>
+              <a:off x="6504733" y="1248094"/>
+              <a:ext cx="0" cy="428306"/>
+            </a:xfrm>
+            <a:prstGeom prst="straightConnector1">
+              <a:avLst/>
+            </a:prstGeom>
+            <a:ln w="28575">
+              <a:solidFill>
+                <a:srgbClr val="C00000"/>
+              </a:solidFill>
+              <a:tailEnd type="arrow"/>
+            </a:ln>
+          </p:spPr>
+          <p:style>
+            <a:lnRef idx="1">
+              <a:schemeClr val="accent1"/>
+            </a:lnRef>
+            <a:fillRef idx="0">
+              <a:schemeClr val="accent1"/>
+            </a:fillRef>
+            <a:effectRef idx="0">
+              <a:schemeClr val="accent1"/>
+            </a:effectRef>
+            <a:fontRef idx="minor">
+              <a:schemeClr val="tx1"/>
+            </a:fontRef>
+          </p:style>
+        </p:cxnSp>
+      </p:grpSp>
+      <p:sp>
+        <p:nvSpPr>
+          <p:cNvPr id="164" name="Rectangle 163"/>
+          <p:cNvSpPr/>
+          <p:nvPr/>
+        </p:nvSpPr>
+        <p:spPr>
+          <a:xfrm>
+            <a:off x="5638800" y="3200400"/>
+            <a:ext cx="841342" cy="166339"/>
+          </a:xfrm>
+          <a:prstGeom prst="rect">
+            <a:avLst/>
+          </a:prstGeom>
+        </p:spPr>
+        <p:style>
+          <a:lnRef idx="2">
+            <a:schemeClr val="accent1">
+              <a:shade val="50000"/>
+            </a:schemeClr>
+          </a:lnRef>
+          <a:fillRef idx="1">
+            <a:schemeClr val="accent1"/>
+          </a:fillRef>
+          <a:effectRef idx="0">
+            <a:schemeClr val="accent1"/>
+          </a:effectRef>
+          <a:fontRef idx="minor">
+            <a:schemeClr val="lt1"/>
+          </a:fontRef>
+        </p:style>
+        <p:txBody>
+          <a:bodyPr rtlCol="0" anchor="ctr"/>
+          <a:lstStyle/>
+          <a:p>
+            <a:pPr algn="ctr"/>
+            <a:r>
+              <a:rPr lang="en-US" dirty="0" err="1" smtClean="0"/>
+              <a:t>Accel</a:t>
+            </a:r>
+            <a:r>
+              <a:rPr lang="en-US" dirty="0" smtClean="0"/>
+              <a:t>.</a:t>
+            </a:r>
+            <a:endParaRPr lang="en-US" dirty="0"/>
+          </a:p>
+        </p:txBody>
+      </p:sp>
+      <p:sp>
+        <p:nvSpPr>
+          <p:cNvPr id="165" name="Rectangle 164"/>
+          <p:cNvSpPr/>
+          <p:nvPr/>
+        </p:nvSpPr>
+        <p:spPr>
+          <a:xfrm>
+            <a:off x="6626258" y="3200400"/>
+            <a:ext cx="841342" cy="166339"/>
+          </a:xfrm>
+          <a:prstGeom prst="rect">
+            <a:avLst/>
+          </a:prstGeom>
+          <a:solidFill>
+            <a:schemeClr val="accent2"/>
+          </a:solidFill>
+          <a:ln>
+            <a:solidFill>
+              <a:srgbClr val="C00000"/>
+            </a:solidFill>
+          </a:ln>
+        </p:spPr>
+        <p:style>
+          <a:lnRef idx="2">
+            <a:schemeClr val="accent1">
+              <a:shade val="50000"/>
+            </a:schemeClr>
+          </a:lnRef>
+          <a:fillRef idx="1">
+            <a:schemeClr val="accent1"/>
+          </a:fillRef>
+          <a:effectRef idx="0">
+            <a:schemeClr val="accent1"/>
+          </a:effectRef>
+          <a:fontRef idx="minor">
+            <a:schemeClr val="lt1"/>
+          </a:fontRef>
+        </p:style>
+        <p:txBody>
+          <a:bodyPr rtlCol="0" anchor="ctr"/>
+          <a:lstStyle/>
+          <a:p>
+            <a:pPr algn="ctr"/>
+            <a:r>
+              <a:rPr lang="en-US" dirty="0" smtClean="0"/>
+              <a:t>Strain</a:t>
+            </a:r>
+            <a:endParaRPr lang="en-US" dirty="0"/>
+          </a:p>
+        </p:txBody>
+      </p:sp>
+      <p:sp>
+        <p:nvSpPr>
+          <p:cNvPr id="143" name="Multiply 142"/>
+          <p:cNvSpPr/>
+          <p:nvPr/>
+        </p:nvSpPr>
+        <p:spPr>
+          <a:xfrm>
+            <a:off x="2667000" y="4992439"/>
+            <a:ext cx="202398" cy="189161"/>
+          </a:xfrm>
+          <a:prstGeom prst="mathMultiply">
+            <a:avLst/>
+          </a:prstGeom>
+          <a:solidFill>
+            <a:srgbClr val="FF0000"/>
+          </a:solidFill>
+          <a:ln>
+            <a:solidFill>
+              <a:srgbClr val="C00000"/>
+            </a:solidFill>
+          </a:ln>
+        </p:spPr>
+        <p:style>
+          <a:lnRef idx="2">
+            <a:schemeClr val="accent1">
+              <a:shade val="50000"/>
+            </a:schemeClr>
+          </a:lnRef>
+          <a:fillRef idx="1">
+            <a:schemeClr val="accent1"/>
+          </a:fillRef>
+          <a:effectRef idx="0">
+            <a:schemeClr val="accent1"/>
+          </a:effectRef>
+          <a:fontRef idx="minor">
+            <a:schemeClr val="lt1"/>
+          </a:fontRef>
+        </p:style>
+        <p:txBody>
+          <a:bodyPr rtlCol="0" anchor="ctr"/>
+          <a:lstStyle/>
+          <a:p>
+            <a:pPr algn="ctr"/>
+            <a:endParaRPr lang="en-US"/>
+          </a:p>
+        </p:txBody>
+      </p:sp>
+      <p:sp>
+        <p:nvSpPr>
+          <p:cNvPr id="144" name="Multiply 143"/>
+          <p:cNvSpPr/>
+          <p:nvPr/>
+        </p:nvSpPr>
+        <p:spPr>
+          <a:xfrm>
+            <a:off x="3607602" y="4992439"/>
+            <a:ext cx="202398" cy="189161"/>
+          </a:xfrm>
+          <a:prstGeom prst="mathMultiply">
+            <a:avLst/>
+          </a:prstGeom>
+          <a:solidFill>
+            <a:srgbClr val="FF0000"/>
+          </a:solidFill>
+          <a:ln>
+            <a:solidFill>
+              <a:srgbClr val="C00000"/>
+            </a:solidFill>
+          </a:ln>
+        </p:spPr>
+        <p:style>
+          <a:lnRef idx="2">
+            <a:schemeClr val="accent1">
+              <a:shade val="50000"/>
+            </a:schemeClr>
+          </a:lnRef>
+          <a:fillRef idx="1">
+            <a:schemeClr val="accent1"/>
+          </a:fillRef>
+          <a:effectRef idx="0">
+            <a:schemeClr val="accent1"/>
+          </a:effectRef>
+          <a:fontRef idx="minor">
+            <a:schemeClr val="lt1"/>
+          </a:fontRef>
+        </p:style>
+        <p:txBody>
+          <a:bodyPr rtlCol="0" anchor="ctr"/>
+          <a:lstStyle/>
+          <a:p>
+            <a:pPr algn="ctr"/>
+            <a:endParaRPr lang="en-US"/>
+          </a:p>
+        </p:txBody>
+      </p:sp>
+      <p:sp>
+        <p:nvSpPr>
+          <p:cNvPr id="148" name="Multiply 147"/>
+          <p:cNvSpPr/>
+          <p:nvPr/>
+        </p:nvSpPr>
+        <p:spPr>
+          <a:xfrm>
+            <a:off x="2667000" y="5268664"/>
+            <a:ext cx="202398" cy="189161"/>
+          </a:xfrm>
+          <a:prstGeom prst="mathMultiply">
+            <a:avLst/>
+          </a:prstGeom>
+          <a:solidFill>
+            <a:srgbClr val="FF0000"/>
+          </a:solidFill>
+          <a:ln>
+            <a:solidFill>
+              <a:srgbClr val="C00000"/>
+            </a:solidFill>
+          </a:ln>
+        </p:spPr>
+        <p:style>
+          <a:lnRef idx="2">
+            <a:schemeClr val="accent1">
+              <a:shade val="50000"/>
+            </a:schemeClr>
+          </a:lnRef>
+          <a:fillRef idx="1">
+            <a:schemeClr val="accent1"/>
+          </a:fillRef>
+          <a:effectRef idx="0">
+            <a:schemeClr val="accent1"/>
+          </a:effectRef>
+          <a:fontRef idx="minor">
+            <a:schemeClr val="lt1"/>
+          </a:fontRef>
+        </p:style>
+        <p:txBody>
+          <a:bodyPr rtlCol="0" anchor="ctr"/>
+          <a:lstStyle/>
+          <a:p>
+            <a:pPr algn="ctr"/>
+            <a:endParaRPr lang="en-US"/>
+          </a:p>
+        </p:txBody>
+      </p:sp>
+      <p:sp>
+        <p:nvSpPr>
+          <p:cNvPr id="149" name="Multiply 148"/>
+          <p:cNvSpPr/>
+          <p:nvPr/>
+        </p:nvSpPr>
+        <p:spPr>
+          <a:xfrm>
+            <a:off x="4191000" y="4992439"/>
+            <a:ext cx="202398" cy="189161"/>
+          </a:xfrm>
+          <a:prstGeom prst="mathMultiply">
+            <a:avLst/>
+          </a:prstGeom>
+          <a:solidFill>
+            <a:srgbClr val="FF0000"/>
+          </a:solidFill>
+          <a:ln>
+            <a:solidFill>
+              <a:srgbClr val="C00000"/>
+            </a:solidFill>
+          </a:ln>
+        </p:spPr>
+        <p:style>
+          <a:lnRef idx="2">
+            <a:schemeClr val="accent1">
+              <a:shade val="50000"/>
+            </a:schemeClr>
+          </a:lnRef>
+          <a:fillRef idx="1">
+            <a:schemeClr val="accent1"/>
+          </a:fillRef>
+          <a:effectRef idx="0">
+            <a:schemeClr val="accent1"/>
+          </a:effectRef>
+          <a:fontRef idx="minor">
+            <a:schemeClr val="lt1"/>
+          </a:fontRef>
+        </p:style>
+        <p:txBody>
+          <a:bodyPr rtlCol="0" anchor="ctr"/>
+          <a:lstStyle/>
+          <a:p>
+            <a:pPr algn="ctr"/>
+            <a:endParaRPr lang="en-US"/>
+          </a:p>
+        </p:txBody>
+      </p:sp>
+      <p:sp>
+        <p:nvSpPr>
+          <p:cNvPr id="161" name="Multiply 160"/>
+          <p:cNvSpPr/>
+          <p:nvPr/>
+        </p:nvSpPr>
+        <p:spPr>
+          <a:xfrm>
+            <a:off x="4512477" y="5144839"/>
+            <a:ext cx="202398" cy="189161"/>
+          </a:xfrm>
+          <a:prstGeom prst="mathMultiply">
+            <a:avLst/>
+          </a:prstGeom>
+          <a:solidFill>
+            <a:srgbClr val="FF0000"/>
+          </a:solidFill>
+          <a:ln>
+            <a:solidFill>
+              <a:srgbClr val="C00000"/>
+            </a:solidFill>
+          </a:ln>
+        </p:spPr>
+        <p:style>
+          <a:lnRef idx="2">
+            <a:schemeClr val="accent1">
+              <a:shade val="50000"/>
+            </a:schemeClr>
+          </a:lnRef>
+          <a:fillRef idx="1">
+            <a:schemeClr val="accent1"/>
+          </a:fillRef>
+          <a:effectRef idx="0">
+            <a:schemeClr val="accent1"/>
+          </a:effectRef>
+          <a:fontRef idx="minor">
+            <a:schemeClr val="lt1"/>
+          </a:fontRef>
+        </p:style>
+        <p:txBody>
+          <a:bodyPr rtlCol="0" anchor="ctr"/>
+          <a:lstStyle/>
+          <a:p>
+            <a:pPr algn="ctr"/>
+            <a:endParaRPr lang="en-US"/>
+          </a:p>
+        </p:txBody>
+      </p:sp>
+    </p:spTree>
+    <p:extLst>
+      <p:ext uri="{BB962C8B-B14F-4D97-AF65-F5344CB8AC3E}">
+        <p14:creationId xmlns:p14="http://schemas.microsoft.com/office/powerpoint/2010/main" val="3850859372"/>
+      </p:ext>
+    </p:extLst>
+  </p:cSld>
+  <p:clrMapOvr>
+    <a:masterClrMapping/>
+  </p:clrMapOvr>
+  <p:timing>
+    <p:tnLst>
+      <p:par>
+        <p:cTn id="1" dur="indefinite" restart="never" nodeType="tmRoot"/>
+      </p:par>
+    </p:tnLst>
+  </p:timing>
+</p:sld>
+</file>
+
+<file path=ppt/slides/slide5.xml><?xml version="1.0" encoding="utf-8"?>
+<p:sld xmlns:a="http://schemas.openxmlformats.org/drawingml/2006/main" xmlns:r="http://schemas.openxmlformats.org/officeDocument/2006/relationships" xmlns:p="http://schemas.openxmlformats.org/presentationml/2006/main">
+  <p:cSld>
+    <p:spTree>
+      <p:nvGrpSpPr>
+        <p:cNvPr id="1" name=""/>
+        <p:cNvGrpSpPr/>
+        <p:nvPr/>
+      </p:nvGrpSpPr>
+      <p:grpSpPr>
+        <a:xfrm>
+          <a:off x="0" y="0"/>
+          <a:ext cx="0" cy="0"/>
+          <a:chOff x="0" y="0"/>
+          <a:chExt cx="0" cy="0"/>
+        </a:xfrm>
+      </p:grpSpPr>
+    </p:spTree>
+    <p:extLst>
+      <p:ext uri="{BB962C8B-B14F-4D97-AF65-F5344CB8AC3E}">
+        <p14:creationId xmlns:p14="http://schemas.microsoft.com/office/powerpoint/2010/main" val="3921688072"/>
+      </p:ext>
+    </p:extLst>
+  </p:cSld>
+  <p:clrMapOvr>
+    <a:masterClrMapping/>
+  </p:clrMapOvr>
+</p:sld>
+</file>
+
+<file path=ppt/slides/slide6.xml><?xml version="1.0" encoding="utf-8"?>
 <p:sld xmlns:a="http://schemas.openxmlformats.org/drawingml/2006/main" xmlns:r="http://schemas.openxmlformats.org/officeDocument/2006/relationships" xmlns:p="http://schemas.openxmlformats.org/presentationml/2006/main">
   <p:cSld>
     <p:spTree>

</xml_diff>